<commit_message>
Update main landing page and fixed display issues.
</commit_message>
<xml_diff>
--- a/docs/FIRA_Pitch_Deck.pptx
+++ b/docs/FIRA_Pitch_Deck.pptx
@@ -4,9 +4,6 @@
   <p:sldMasterIdLst>
     <p:sldMasterId id="2147483648" r:id="rId1"/>
   </p:sldMasterIdLst>
-  <p:notesMasterIdLst>
-    <p:notesMasterId r:id="rId17"/>
-  </p:notesMasterIdLst>
   <p:sldIdLst>
     <p:sldId id="256" r:id="rId2"/>
     <p:sldId id="257" r:id="rId3"/>
@@ -24,7 +21,10 @@
     <p:sldId id="269" r:id="rId15"/>
     <p:sldId id="270" r:id="rId16"/>
   </p:sldIdLst>
-  <p:sldSz cx="9144000" cy="5143500" type="screen16x9"/>
+  <p:notesMasterIdLst>
+    <p:notesMasterId r:id="rId17"/>
+  </p:notesMasterIdLst>
+  <p:sldSz cx="9144000" cy="5143500"/>
   <p:notesSz cx="5143500" cy="9144000"/>
   <p:defaultTextStyle>
     <a:lvl1pPr marL="0" algn="l" defTabSz="914400" rtl="0" eaLnBrk="1" latinLnBrk="0" hangingPunct="1">
@@ -118,11 +118,6 @@
       </a:defRPr>
     </a:lvl9pPr>
   </p:defaultTextStyle>
-  <p:extLst>
-    <p:ext uri="{EFAFB233-063F-42B5-8137-9DF3F51BA10A}">
-      <p15:sldGuideLst xmlns:p15="http://schemas.microsoft.com/office/powerpoint/2012/main"/>
-    </p:ext>
-  </p:extLst>
 </p:presentation>
 </file>
 
@@ -148,10 +143,234 @@
           <a:chExt cx="0" cy="0"/>
         </a:xfrm>
       </p:grpSpPr>
+      <p:sp>
+        <p:nvSpPr>
+          <p:cNvPr id="2" name="Header Placeholder 1"/>
+          <p:cNvSpPr>
+            <a:spLocks noGrp="1"/>
+          </p:cNvSpPr>
+          <p:nvPr>
+            <p:ph type="hdr" sz="quarter"/>
+          </p:nvPr>
+        </p:nvSpPr>
+        <p:spPr>
+          <a:xfrm>
+            <a:off x="0" y="0"/>
+            <a:ext cx="2971800" cy="458788"/>
+          </a:xfrm>
+          <a:prstGeom prst="rect">
+            <a:avLst/>
+          </a:prstGeom>
+        </p:spPr>
+        <p:txBody>
+          <a:bodyPr vert="horz" lIns="91440" tIns="45720" rIns="91440" bIns="45720" rtlCol="0"/>
+          <a:lstStyle>
+            <a:lvl1pPr algn="l">
+              <a:defRPr sz="1200"/>
+            </a:lvl1pPr>
+          </a:lstStyle>
+          <a:p>
+            <a:endParaRPr lang="en-US"/>
+          </a:p>
+        </p:txBody>
+      </p:sp>
+      <p:sp>
+        <p:nvSpPr>
+          <p:cNvPr id="3" name="Date Placeholder 2"/>
+          <p:cNvSpPr>
+            <a:spLocks noGrp="1"/>
+          </p:cNvSpPr>
+          <p:nvPr>
+            <p:ph type="dt" idx="1"/>
+          </p:nvPr>
+        </p:nvSpPr>
+        <p:spPr>
+          <a:xfrm>
+            <a:off x="3884613" y="0"/>
+            <a:ext cx="2971800" cy="458788"/>
+          </a:xfrm>
+          <a:prstGeom prst="rect">
+            <a:avLst/>
+          </a:prstGeom>
+        </p:spPr>
+        <p:txBody>
+          <a:bodyPr vert="horz" lIns="91440" tIns="45720" rIns="91440" bIns="45720" rtlCol="0"/>
+          <a:lstStyle>
+            <a:lvl1pPr algn="r">
+              <a:defRPr sz="1200"/>
+            </a:lvl1pPr>
+          </a:lstStyle>
+          <a:p>
+            <a:fld id="{5282F153-3F37-0F45-9E97-73ACFA13230C}" type="datetimeFigureOut">
+              <a:rPr lang="en-US"/>
+              <a:t>7/23/19</a:t>
+            </a:fld>
+            <a:endParaRPr lang="en-US"/>
+          </a:p>
+        </p:txBody>
+      </p:sp>
+      <p:sp>
+        <p:nvSpPr>
+          <p:cNvPr id="4" name="Slide Image Placeholder 3"/>
+          <p:cNvSpPr>
+            <a:spLocks noGrp="1" noRot="1" noChangeAspect="1"/>
+          </p:cNvSpPr>
+          <p:nvPr>
+            <p:ph type="sldImg" idx="2"/>
+          </p:nvPr>
+        </p:nvSpPr>
+        <p:spPr>
+          <a:xfrm>
+            <a:off x="685800" y="1143000"/>
+            <a:ext cx="5486400" cy="3086100"/>
+          </a:xfrm>
+          <a:prstGeom prst="rect">
+            <a:avLst/>
+          </a:prstGeom>
+          <a:noFill/>
+          <a:ln w="12700">
+            <a:solidFill>
+              <a:prstClr val="black"/>
+            </a:solidFill>
+          </a:ln>
+        </p:spPr>
+        <p:txBody>
+          <a:bodyPr vert="horz" lIns="91440" tIns="45720" rIns="91440" bIns="45720" rtlCol="0" anchor="ctr"/>
+          <a:lstStyle/>
+          <a:p>
+            <a:endParaRPr lang="en-US"/>
+          </a:p>
+        </p:txBody>
+      </p:sp>
+      <p:sp>
+        <p:nvSpPr>
+          <p:cNvPr id="5" name="Notes Placeholder 4"/>
+          <p:cNvSpPr>
+            <a:spLocks noGrp="1"/>
+          </p:cNvSpPr>
+          <p:nvPr>
+            <p:ph type="body" sz="quarter" idx="3"/>
+          </p:nvPr>
+        </p:nvSpPr>
+        <p:spPr>
+          <a:xfrm>
+            <a:off x="685800" y="4400550"/>
+            <a:ext cx="5486400" cy="3600450"/>
+          </a:xfrm>
+          <a:prstGeom prst="rect">
+            <a:avLst/>
+          </a:prstGeom>
+        </p:spPr>
+        <p:txBody>
+          <a:bodyPr vert="horz" lIns="91440" tIns="45720" rIns="91440" bIns="45720" rtlCol="0"/>
+          <a:lstStyle/>
+          <a:p>
+            <a:pPr lvl="0"/>
+            <a:r>
+              <a:rPr lang="en-US"/>
+              <a:t>Click to edit Master text styles</a:t>
+            </a:r>
+          </a:p>
+          <a:p>
+            <a:pPr lvl="1"/>
+            <a:r>
+              <a:rPr lang="en-US"/>
+              <a:t>Second level</a:t>
+            </a:r>
+          </a:p>
+          <a:p>
+            <a:pPr lvl="2"/>
+            <a:r>
+              <a:rPr lang="en-US"/>
+              <a:t>Third level</a:t>
+            </a:r>
+          </a:p>
+          <a:p>
+            <a:pPr lvl="3"/>
+            <a:r>
+              <a:rPr lang="en-US"/>
+              <a:t>Fourth level</a:t>
+            </a:r>
+          </a:p>
+          <a:p>
+            <a:pPr lvl="4"/>
+            <a:r>
+              <a:rPr lang="en-US"/>
+              <a:t>Fifth level</a:t>
+            </a:r>
+          </a:p>
+        </p:txBody>
+      </p:sp>
+      <p:sp>
+        <p:nvSpPr>
+          <p:cNvPr id="6" name="Footer Placeholder 5"/>
+          <p:cNvSpPr>
+            <a:spLocks noGrp="1"/>
+          </p:cNvSpPr>
+          <p:nvPr>
+            <p:ph type="ftr" sz="quarter" idx="4"/>
+          </p:nvPr>
+        </p:nvSpPr>
+        <p:spPr>
+          <a:xfrm>
+            <a:off x="0" y="8685213"/>
+            <a:ext cx="2971800" cy="458787"/>
+          </a:xfrm>
+          <a:prstGeom prst="rect">
+            <a:avLst/>
+          </a:prstGeom>
+        </p:spPr>
+        <p:txBody>
+          <a:bodyPr vert="horz" lIns="91440" tIns="45720" rIns="91440" bIns="45720" rtlCol="0" anchor="b"/>
+          <a:lstStyle>
+            <a:lvl1pPr algn="l">
+              <a:defRPr sz="1200"/>
+            </a:lvl1pPr>
+          </a:lstStyle>
+          <a:p>
+            <a:endParaRPr lang="en-US"/>
+          </a:p>
+        </p:txBody>
+      </p:sp>
+      <p:sp>
+        <p:nvSpPr>
+          <p:cNvPr id="7" name="Slide Number Placeholder 6"/>
+          <p:cNvSpPr>
+            <a:spLocks noGrp="1"/>
+          </p:cNvSpPr>
+          <p:nvPr>
+            <p:ph type="sldNum" sz="quarter" idx="5"/>
+          </p:nvPr>
+        </p:nvSpPr>
+        <p:spPr>
+          <a:xfrm>
+            <a:off x="3884613" y="8685213"/>
+            <a:ext cx="2971800" cy="458787"/>
+          </a:xfrm>
+          <a:prstGeom prst="rect">
+            <a:avLst/>
+          </a:prstGeom>
+        </p:spPr>
+        <p:txBody>
+          <a:bodyPr vert="horz" lIns="91440" tIns="45720" rIns="91440" bIns="45720" rtlCol="0" anchor="b"/>
+          <a:lstStyle>
+            <a:lvl1pPr algn="r">
+              <a:defRPr sz="1200"/>
+            </a:lvl1pPr>
+          </a:lstStyle>
+          <a:p>
+            <a:fld id="{CE5E9CC1-C706-0F49-92D6-E571CC5EEA8F}" type="slidenum">
+              <a:rPr lang="en-US"/>
+              <a:t>‹#›</a:t>
+            </a:fld>
+            <a:endParaRPr lang="en-US"/>
+          </a:p>
+        </p:txBody>
+      </p:sp>
     </p:spTree>
     <p:extLst>
       <p:ext uri="{BB962C8B-B14F-4D97-AF65-F5344CB8AC3E}">
-        <p14:creationId xmlns:p14="http://schemas.microsoft.com/office/powerpoint/2010/main" val="2526640505"/>
+        <p14:creationId xmlns:p14="http://schemas.microsoft.com/office/powerpoint/2010/main" val="1024086991"/>
       </p:ext>
     </p:extLst>
   </p:cSld>
@@ -295,6 +514,10 @@
           <a:bodyPr/>
           <a:lstStyle/>
           <a:p>
+            <a:r>
+              <a:rPr lang="en-US" dirty="0"/>
+              <a:t/>
+            </a:r>
             <a:endParaRPr lang="en-US" dirty="0"/>
           </a:p>
         </p:txBody>
@@ -379,6 +602,10 @@
           <a:bodyPr/>
           <a:lstStyle/>
           <a:p>
+            <a:r>
+              <a:rPr lang="en-US" dirty="0"/>
+              <a:t/>
+            </a:r>
             <a:endParaRPr lang="en-US" dirty="0"/>
           </a:p>
         </p:txBody>
@@ -463,6 +690,10 @@
           <a:bodyPr/>
           <a:lstStyle/>
           <a:p>
+            <a:r>
+              <a:rPr lang="en-US" dirty="0"/>
+              <a:t/>
+            </a:r>
             <a:endParaRPr lang="en-US" dirty="0"/>
           </a:p>
         </p:txBody>
@@ -547,6 +778,10 @@
           <a:bodyPr/>
           <a:lstStyle/>
           <a:p>
+            <a:r>
+              <a:rPr lang="en-US" dirty="0"/>
+              <a:t/>
+            </a:r>
             <a:endParaRPr lang="en-US" dirty="0"/>
           </a:p>
         </p:txBody>
@@ -631,6 +866,10 @@
           <a:bodyPr/>
           <a:lstStyle/>
           <a:p>
+            <a:r>
+              <a:rPr lang="en-US" dirty="0"/>
+              <a:t/>
+            </a:r>
             <a:endParaRPr lang="en-US" dirty="0"/>
           </a:p>
         </p:txBody>
@@ -715,6 +954,10 @@
           <a:bodyPr/>
           <a:lstStyle/>
           <a:p>
+            <a:r>
+              <a:rPr lang="en-US" dirty="0"/>
+              <a:t/>
+            </a:r>
             <a:endParaRPr lang="en-US" dirty="0"/>
           </a:p>
         </p:txBody>
@@ -799,6 +1042,10 @@
           <a:bodyPr/>
           <a:lstStyle/>
           <a:p>
+            <a:r>
+              <a:rPr lang="en-US" dirty="0"/>
+              <a:t/>
+            </a:r>
             <a:endParaRPr lang="en-US" dirty="0"/>
           </a:p>
         </p:txBody>
@@ -883,6 +1130,10 @@
           <a:bodyPr/>
           <a:lstStyle/>
           <a:p>
+            <a:r>
+              <a:rPr lang="en-US" dirty="0"/>
+              <a:t/>
+            </a:r>
             <a:endParaRPr lang="en-US" dirty="0"/>
           </a:p>
         </p:txBody>
@@ -967,6 +1218,10 @@
           <a:bodyPr/>
           <a:lstStyle/>
           <a:p>
+            <a:r>
+              <a:rPr lang="en-US" dirty="0"/>
+              <a:t/>
+            </a:r>
             <a:endParaRPr lang="en-US" dirty="0"/>
           </a:p>
         </p:txBody>
@@ -1051,6 +1306,10 @@
           <a:bodyPr/>
           <a:lstStyle/>
           <a:p>
+            <a:r>
+              <a:rPr lang="en-US" dirty="0"/>
+              <a:t/>
+            </a:r>
             <a:endParaRPr lang="en-US" dirty="0"/>
           </a:p>
         </p:txBody>
@@ -1135,6 +1394,10 @@
           <a:bodyPr/>
           <a:lstStyle/>
           <a:p>
+            <a:r>
+              <a:rPr lang="en-US" dirty="0"/>
+              <a:t/>
+            </a:r>
             <a:endParaRPr lang="en-US" dirty="0"/>
           </a:p>
         </p:txBody>
@@ -1219,6 +1482,10 @@
           <a:bodyPr/>
           <a:lstStyle/>
           <a:p>
+            <a:r>
+              <a:rPr lang="en-US" dirty="0"/>
+              <a:t/>
+            </a:r>
             <a:endParaRPr lang="en-US" dirty="0"/>
           </a:p>
         </p:txBody>
@@ -1303,6 +1570,10 @@
           <a:bodyPr/>
           <a:lstStyle/>
           <a:p>
+            <a:r>
+              <a:rPr lang="en-US" dirty="0"/>
+              <a:t/>
+            </a:r>
             <a:endParaRPr lang="en-US" dirty="0"/>
           </a:p>
         </p:txBody>
@@ -1387,6 +1658,10 @@
           <a:bodyPr/>
           <a:lstStyle/>
           <a:p>
+            <a:r>
+              <a:rPr lang="en-US" dirty="0"/>
+              <a:t/>
+            </a:r>
             <a:endParaRPr lang="en-US" dirty="0"/>
           </a:p>
         </p:txBody>
@@ -1471,6 +1746,10 @@
           <a:bodyPr/>
           <a:lstStyle/>
           <a:p>
+            <a:r>
+              <a:rPr lang="en-US" dirty="0"/>
+              <a:t/>
+            </a:r>
             <a:endParaRPr lang="en-US" dirty="0"/>
           </a:p>
         </p:txBody>
@@ -1544,11 +1823,6 @@
 <file path=ppt/slideMasters/slideMaster1.xml><?xml version="1.0" encoding="utf-8"?>
 <p:sldMaster xmlns:a="http://schemas.openxmlformats.org/drawingml/2006/main" xmlns:r="http://schemas.openxmlformats.org/officeDocument/2006/relationships" xmlns:p="http://schemas.openxmlformats.org/presentationml/2006/main">
   <p:cSld>
-    <p:bg>
-      <p:bgRef idx="1001">
-        <a:schemeClr val="bg1"/>
-      </p:bgRef>
-    </p:bg>
     <p:spTree>
       <p:nvGrpSpPr>
         <p:cNvPr id="1" name=""/>
@@ -1831,7 +2105,6 @@
         <a:solidFill>
           <a:srgbClr val="1B5E20"/>
         </a:solidFill>
-        <a:effectLst/>
       </p:bgPr>
     </p:bg>
     <p:spTree>
@@ -1867,13 +2140,6 @@
           </a:solidFill>
           <a:ln/>
         </p:spPr>
-        <p:txBody>
-          <a:bodyPr/>
-          <a:lstStyle/>
-          <a:p>
-            <a:endParaRPr lang="en-US"/>
-          </a:p>
-        </p:txBody>
       </p:sp>
       <p:sp>
         <p:nvSpPr>
@@ -1896,11 +2162,11 @@
           <a:bodyPr wrap="square" lIns="0" tIns="0" rIns="0" bIns="0" rtlCol="0" anchor="ctr"/>
           <a:lstStyle/>
           <a:p>
-            <a:pPr marL="0" indent="0" algn="l">
-              <a:buNone/>
-            </a:pPr>
-            <a:r>
-              <a:rPr lang="en-US" sz="7200" b="1" kern="0" spc="800" dirty="0">
+            <a:pPr algn="l" indent="0" marL="0">
+              <a:buNone/>
+            </a:pPr>
+            <a:r>
+              <a:rPr lang="en-US" sz="7200" b="1" spc="800" kern="0" dirty="0">
                 <a:solidFill>
                   <a:srgbClr val="FFFFFF"/>
                 </a:solidFill>
@@ -1935,7 +2201,7 @@
           <a:bodyPr wrap="square" lIns="0" tIns="0" rIns="0" bIns="0" rtlCol="0" anchor="ctr"/>
           <a:lstStyle/>
           <a:p>
-            <a:pPr marL="0" indent="0" algn="l">
+            <a:pPr algn="l" indent="0" marL="0">
               <a:buNone/>
             </a:pPr>
             <a:r>
@@ -1974,7 +2240,7 @@
           <a:bodyPr wrap="square" lIns="0" tIns="0" rIns="0" bIns="0" rtlCol="0" anchor="ctr"/>
           <a:lstStyle/>
           <a:p>
-            <a:pPr marL="0" indent="0" algn="l">
+            <a:pPr algn="l" indent="0" marL="0">
               <a:buNone/>
             </a:pPr>
             <a:r>
@@ -2011,13 +2277,6 @@
           </a:solidFill>
           <a:ln/>
         </p:spPr>
-        <p:txBody>
-          <a:bodyPr/>
-          <a:lstStyle/>
-          <a:p>
-            <a:endParaRPr lang="en-US"/>
-          </a:p>
-        </p:txBody>
       </p:sp>
       <p:sp>
         <p:nvSpPr>
@@ -2040,7 +2299,7 @@
           <a:bodyPr wrap="square" rtlCol="0" anchor="ctr"/>
           <a:lstStyle/>
           <a:p>
-            <a:pPr marL="0" indent="0" algn="l">
+            <a:pPr algn="l" indent="0" marL="0">
               <a:buNone/>
             </a:pPr>
             <a:r>
@@ -2074,7 +2333,6 @@
         <a:solidFill>
           <a:srgbClr val="1B5E20"/>
         </a:solidFill>
-        <a:effectLst/>
       </p:bgPr>
     </p:bg>
     <p:spTree>
@@ -2110,13 +2368,6 @@
           </a:solidFill>
           <a:ln/>
         </p:spPr>
-        <p:txBody>
-          <a:bodyPr/>
-          <a:lstStyle/>
-          <a:p>
-            <a:endParaRPr lang="en-US"/>
-          </a:p>
-        </p:txBody>
       </p:sp>
       <p:sp>
         <p:nvSpPr>
@@ -2139,7 +2390,7 @@
           <a:bodyPr wrap="square" lIns="0" tIns="0" rIns="0" bIns="0" rtlCol="0" anchor="ctr"/>
           <a:lstStyle/>
           <a:p>
-            <a:pPr marL="0" indent="0">
+            <a:pPr indent="0" marL="0">
               <a:buNone/>
             </a:pPr>
             <a:r>
@@ -2176,20 +2427,13 @@
           </a:solidFill>
           <a:ln/>
           <a:effectLst>
-            <a:outerShdw blurRad="76200" dist="25400" dir="8100000" algn="bl" rotWithShape="0">
+            <a:outerShdw sx="100000" sy="100000" kx="0" ky="0" algn="bl" rotWithShape="0" blurRad="76200" dist="25400" dir="8100000">
               <a:srgbClr val="000000">
                 <a:alpha val="12000"/>
               </a:srgbClr>
             </a:outerShdw>
           </a:effectLst>
         </p:spPr>
-        <p:txBody>
-          <a:bodyPr/>
-          <a:lstStyle/>
-          <a:p>
-            <a:endParaRPr lang="en-US"/>
-          </a:p>
-        </p:txBody>
       </p:sp>
       <p:sp>
         <p:nvSpPr>
@@ -2210,13 +2454,6 @@
           </a:solidFill>
           <a:ln/>
         </p:spPr>
-        <p:txBody>
-          <a:bodyPr/>
-          <a:lstStyle/>
-          <a:p>
-            <a:endParaRPr lang="en-US"/>
-          </a:p>
-        </p:txBody>
       </p:sp>
       <p:sp>
         <p:nvSpPr>
@@ -2239,7 +2476,7 @@
           <a:bodyPr wrap="square" lIns="0" tIns="0" rIns="0" bIns="0" rtlCol="0" anchor="ctr"/>
           <a:lstStyle/>
           <a:p>
-            <a:pPr marL="0" indent="0">
+            <a:pPr indent="0" marL="0">
               <a:buNone/>
             </a:pPr>
             <a:r>
@@ -2278,7 +2515,7 @@
           <a:bodyPr wrap="square" lIns="0" tIns="0" rIns="0" bIns="0" rtlCol="0" anchor="ctr"/>
           <a:lstStyle/>
           <a:p>
-            <a:pPr marL="0" indent="0">
+            <a:pPr indent="0" marL="0">
               <a:buNone/>
             </a:pPr>
             <a:r>
@@ -2315,20 +2552,13 @@
           </a:solidFill>
           <a:ln/>
           <a:effectLst>
-            <a:outerShdw blurRad="76200" dist="25400" dir="8100000" algn="bl" rotWithShape="0">
+            <a:outerShdw sx="100000" sy="100000" kx="0" ky="0" algn="bl" rotWithShape="0" blurRad="76200" dist="25400" dir="8100000">
               <a:srgbClr val="000000">
                 <a:alpha val="12000"/>
               </a:srgbClr>
             </a:outerShdw>
           </a:effectLst>
         </p:spPr>
-        <p:txBody>
-          <a:bodyPr/>
-          <a:lstStyle/>
-          <a:p>
-            <a:endParaRPr lang="en-US"/>
-          </a:p>
-        </p:txBody>
       </p:sp>
       <p:sp>
         <p:nvSpPr>
@@ -2349,13 +2579,6 @@
           </a:solidFill>
           <a:ln/>
         </p:spPr>
-        <p:txBody>
-          <a:bodyPr/>
-          <a:lstStyle/>
-          <a:p>
-            <a:endParaRPr lang="en-US"/>
-          </a:p>
-        </p:txBody>
       </p:sp>
       <p:sp>
         <p:nvSpPr>
@@ -2378,7 +2601,7 @@
           <a:bodyPr wrap="square" lIns="0" tIns="0" rIns="0" bIns="0" rtlCol="0" anchor="ctr"/>
           <a:lstStyle/>
           <a:p>
-            <a:pPr marL="0" indent="0">
+            <a:pPr indent="0" marL="0">
               <a:buNone/>
             </a:pPr>
             <a:r>
@@ -2417,7 +2640,7 @@
           <a:bodyPr wrap="square" lIns="0" tIns="0" rIns="0" bIns="0" rtlCol="0" anchor="ctr"/>
           <a:lstStyle/>
           <a:p>
-            <a:pPr marL="0" indent="0">
+            <a:pPr indent="0" marL="0">
               <a:buNone/>
             </a:pPr>
             <a:r>
@@ -2454,20 +2677,13 @@
           </a:solidFill>
           <a:ln/>
           <a:effectLst>
-            <a:outerShdw blurRad="76200" dist="25400" dir="8100000" algn="bl" rotWithShape="0">
+            <a:outerShdw sx="100000" sy="100000" kx="0" ky="0" algn="bl" rotWithShape="0" blurRad="76200" dist="25400" dir="8100000">
               <a:srgbClr val="000000">
                 <a:alpha val="12000"/>
               </a:srgbClr>
             </a:outerShdw>
           </a:effectLst>
         </p:spPr>
-        <p:txBody>
-          <a:bodyPr/>
-          <a:lstStyle/>
-          <a:p>
-            <a:endParaRPr lang="en-US"/>
-          </a:p>
-        </p:txBody>
       </p:sp>
       <p:sp>
         <p:nvSpPr>
@@ -2488,13 +2704,6 @@
           </a:solidFill>
           <a:ln/>
         </p:spPr>
-        <p:txBody>
-          <a:bodyPr/>
-          <a:lstStyle/>
-          <a:p>
-            <a:endParaRPr lang="en-US"/>
-          </a:p>
-        </p:txBody>
       </p:sp>
       <p:sp>
         <p:nvSpPr>
@@ -2517,7 +2726,7 @@
           <a:bodyPr wrap="square" lIns="0" tIns="0" rIns="0" bIns="0" rtlCol="0" anchor="ctr"/>
           <a:lstStyle/>
           <a:p>
-            <a:pPr marL="0" indent="0">
+            <a:pPr indent="0" marL="0">
               <a:buNone/>
             </a:pPr>
             <a:r>
@@ -2556,7 +2765,7 @@
           <a:bodyPr wrap="square" lIns="0" tIns="0" rIns="0" bIns="0" rtlCol="0" anchor="ctr"/>
           <a:lstStyle/>
           <a:p>
-            <a:pPr marL="0" indent="0">
+            <a:pPr indent="0" marL="0">
               <a:buNone/>
             </a:pPr>
             <a:r>
@@ -2593,20 +2802,13 @@
           </a:solidFill>
           <a:ln/>
           <a:effectLst>
-            <a:outerShdw blurRad="76200" dist="25400" dir="8100000" algn="bl" rotWithShape="0">
+            <a:outerShdw sx="100000" sy="100000" kx="0" ky="0" algn="bl" rotWithShape="0" blurRad="76200" dist="25400" dir="8100000">
               <a:srgbClr val="000000">
                 <a:alpha val="12000"/>
               </a:srgbClr>
             </a:outerShdw>
           </a:effectLst>
         </p:spPr>
-        <p:txBody>
-          <a:bodyPr/>
-          <a:lstStyle/>
-          <a:p>
-            <a:endParaRPr lang="en-US"/>
-          </a:p>
-        </p:txBody>
       </p:sp>
       <p:sp>
         <p:nvSpPr>
@@ -2627,13 +2829,6 @@
           </a:solidFill>
           <a:ln/>
         </p:spPr>
-        <p:txBody>
-          <a:bodyPr/>
-          <a:lstStyle/>
-          <a:p>
-            <a:endParaRPr lang="en-US"/>
-          </a:p>
-        </p:txBody>
       </p:sp>
       <p:sp>
         <p:nvSpPr>
@@ -2656,7 +2851,7 @@
           <a:bodyPr wrap="square" lIns="0" tIns="0" rIns="0" bIns="0" rtlCol="0" anchor="ctr"/>
           <a:lstStyle/>
           <a:p>
-            <a:pPr marL="0" indent="0">
+            <a:pPr indent="0" marL="0">
               <a:buNone/>
             </a:pPr>
             <a:r>
@@ -2695,7 +2890,7 @@
           <a:bodyPr wrap="square" lIns="0" tIns="0" rIns="0" bIns="0" rtlCol="0" anchor="ctr"/>
           <a:lstStyle/>
           <a:p>
-            <a:pPr marL="0" indent="0">
+            <a:pPr indent="0" marL="0">
               <a:buNone/>
             </a:pPr>
             <a:r>
@@ -2734,7 +2929,7 @@
           <a:bodyPr wrap="square" rtlCol="0" anchor="ctr"/>
           <a:lstStyle/>
           <a:p>
-            <a:pPr marL="0" indent="0" algn="r">
+            <a:pPr algn="r" indent="0" marL="0">
               <a:buNone/>
             </a:pPr>
             <a:r>
@@ -2768,7 +2963,6 @@
         <a:solidFill>
           <a:srgbClr val="FAFAFA"/>
         </a:solidFill>
-        <a:effectLst/>
       </p:bgPr>
     </p:bg>
     <p:spTree>
@@ -2804,13 +2998,6 @@
           </a:solidFill>
           <a:ln/>
         </p:spPr>
-        <p:txBody>
-          <a:bodyPr/>
-          <a:lstStyle/>
-          <a:p>
-            <a:endParaRPr lang="en-US"/>
-          </a:p>
-        </p:txBody>
       </p:sp>
       <p:sp>
         <p:nvSpPr>
@@ -2833,7 +3020,7 @@
           <a:bodyPr wrap="square" lIns="0" tIns="0" rIns="0" bIns="0" rtlCol="0" anchor="ctr"/>
           <a:lstStyle/>
           <a:p>
-            <a:pPr marL="0" indent="0">
+            <a:pPr indent="0" marL="0">
               <a:buNone/>
             </a:pPr>
             <a:r>
@@ -2870,20 +3057,13 @@
           </a:solidFill>
           <a:ln/>
           <a:effectLst>
-            <a:outerShdw blurRad="76200" dist="25400" dir="8100000" algn="bl" rotWithShape="0">
+            <a:outerShdw sx="100000" sy="100000" kx="0" ky="0" algn="bl" rotWithShape="0" blurRad="76200" dist="25400" dir="8100000">
               <a:srgbClr val="000000">
                 <a:alpha val="12000"/>
               </a:srgbClr>
             </a:outerShdw>
           </a:effectLst>
         </p:spPr>
-        <p:txBody>
-          <a:bodyPr/>
-          <a:lstStyle/>
-          <a:p>
-            <a:endParaRPr lang="en-US"/>
-          </a:p>
-        </p:txBody>
       </p:sp>
       <p:sp>
         <p:nvSpPr>
@@ -2904,13 +3084,6 @@
           </a:solidFill>
           <a:ln/>
         </p:spPr>
-        <p:txBody>
-          <a:bodyPr/>
-          <a:lstStyle/>
-          <a:p>
-            <a:endParaRPr lang="en-US"/>
-          </a:p>
-        </p:txBody>
       </p:sp>
       <p:sp>
         <p:nvSpPr>
@@ -2933,7 +3106,7 @@
           <a:bodyPr wrap="square" lIns="0" tIns="0" rIns="0" bIns="0" rtlCol="0" anchor="ctr"/>
           <a:lstStyle/>
           <a:p>
-            <a:pPr marL="0" indent="0" algn="ctr">
+            <a:pPr algn="ctr" indent="0" marL="0">
               <a:buNone/>
             </a:pPr>
             <a:r>
@@ -2972,7 +3145,7 @@
           <a:bodyPr wrap="square" lIns="0" tIns="0" rIns="0" bIns="0" rtlCol="0" anchor="t"/>
           <a:lstStyle/>
           <a:p>
-            <a:pPr marL="0" indent="0" algn="ctr">
+            <a:pPr algn="ctr" indent="0" marL="0">
               <a:buNone/>
             </a:pPr>
             <a:r>
@@ -2989,7 +3162,7 @@
             <a:endParaRPr lang="en-US" sz="1100" dirty="0"/>
           </a:p>
           <a:p>
-            <a:pPr marL="0" indent="0" algn="ctr">
+            <a:pPr algn="ctr" indent="0" marL="0">
               <a:buNone/>
             </a:pPr>
             <a:r>
@@ -3026,20 +3199,13 @@
           </a:solidFill>
           <a:ln/>
           <a:effectLst>
-            <a:outerShdw blurRad="76200" dist="25400" dir="8100000" algn="bl" rotWithShape="0">
+            <a:outerShdw sx="100000" sy="100000" kx="0" ky="0" algn="bl" rotWithShape="0" blurRad="76200" dist="25400" dir="8100000">
               <a:srgbClr val="000000">
                 <a:alpha val="12000"/>
               </a:srgbClr>
             </a:outerShdw>
           </a:effectLst>
         </p:spPr>
-        <p:txBody>
-          <a:bodyPr/>
-          <a:lstStyle/>
-          <a:p>
-            <a:endParaRPr lang="en-US"/>
-          </a:p>
-        </p:txBody>
       </p:sp>
       <p:sp>
         <p:nvSpPr>
@@ -3060,13 +3226,6 @@
           </a:solidFill>
           <a:ln/>
         </p:spPr>
-        <p:txBody>
-          <a:bodyPr/>
-          <a:lstStyle/>
-          <a:p>
-            <a:endParaRPr lang="en-US"/>
-          </a:p>
-        </p:txBody>
       </p:sp>
       <p:sp>
         <p:nvSpPr>
@@ -3089,7 +3248,7 @@
           <a:bodyPr wrap="square" lIns="0" tIns="0" rIns="0" bIns="0" rtlCol="0" anchor="ctr"/>
           <a:lstStyle/>
           <a:p>
-            <a:pPr marL="0" indent="0" algn="ctr">
+            <a:pPr algn="ctr" indent="0" marL="0">
               <a:buNone/>
             </a:pPr>
             <a:r>
@@ -3128,7 +3287,7 @@
           <a:bodyPr wrap="square" lIns="0" tIns="0" rIns="0" bIns="0" rtlCol="0" anchor="t"/>
           <a:lstStyle/>
           <a:p>
-            <a:pPr marL="0" indent="0" algn="ctr">
+            <a:pPr algn="ctr" indent="0" marL="0">
               <a:buNone/>
             </a:pPr>
             <a:r>
@@ -3145,7 +3304,7 @@
             <a:endParaRPr lang="en-US" sz="1100" dirty="0"/>
           </a:p>
           <a:p>
-            <a:pPr marL="0" indent="0" algn="ctr">
+            <a:pPr algn="ctr" indent="0" marL="0">
               <a:buNone/>
             </a:pPr>
             <a:r>
@@ -3182,20 +3341,13 @@
           </a:solidFill>
           <a:ln/>
           <a:effectLst>
-            <a:outerShdw blurRad="76200" dist="25400" dir="8100000" algn="bl" rotWithShape="0">
+            <a:outerShdw sx="100000" sy="100000" kx="0" ky="0" algn="bl" rotWithShape="0" blurRad="76200" dist="25400" dir="8100000">
               <a:srgbClr val="000000">
                 <a:alpha val="12000"/>
               </a:srgbClr>
             </a:outerShdw>
           </a:effectLst>
         </p:spPr>
-        <p:txBody>
-          <a:bodyPr/>
-          <a:lstStyle/>
-          <a:p>
-            <a:endParaRPr lang="en-US"/>
-          </a:p>
-        </p:txBody>
       </p:sp>
       <p:sp>
         <p:nvSpPr>
@@ -3216,13 +3368,6 @@
           </a:solidFill>
           <a:ln/>
         </p:spPr>
-        <p:txBody>
-          <a:bodyPr/>
-          <a:lstStyle/>
-          <a:p>
-            <a:endParaRPr lang="en-US"/>
-          </a:p>
-        </p:txBody>
       </p:sp>
       <p:sp>
         <p:nvSpPr>
@@ -3245,7 +3390,7 @@
           <a:bodyPr wrap="square" lIns="0" tIns="0" rIns="0" bIns="0" rtlCol="0" anchor="ctr"/>
           <a:lstStyle/>
           <a:p>
-            <a:pPr marL="0" indent="0" algn="ctr">
+            <a:pPr algn="ctr" indent="0" marL="0">
               <a:buNone/>
             </a:pPr>
             <a:r>
@@ -3284,7 +3429,7 @@
           <a:bodyPr wrap="square" lIns="0" tIns="0" rIns="0" bIns="0" rtlCol="0" anchor="t"/>
           <a:lstStyle/>
           <a:p>
-            <a:pPr marL="0" indent="0" algn="ctr">
+            <a:pPr algn="ctr" indent="0" marL="0">
               <a:buNone/>
             </a:pPr>
             <a:r>
@@ -3301,7 +3446,7 @@
             <a:endParaRPr lang="en-US" sz="1100" dirty="0"/>
           </a:p>
           <a:p>
-            <a:pPr marL="0" indent="0" algn="ctr">
+            <a:pPr algn="ctr" indent="0" marL="0">
               <a:buNone/>
             </a:pPr>
             <a:r>
@@ -3338,20 +3483,13 @@
           </a:solidFill>
           <a:ln/>
           <a:effectLst>
-            <a:outerShdw blurRad="76200" dist="25400" dir="8100000" algn="bl" rotWithShape="0">
+            <a:outerShdw sx="100000" sy="100000" kx="0" ky="0" algn="bl" rotWithShape="0" blurRad="76200" dist="25400" dir="8100000">
               <a:srgbClr val="000000">
                 <a:alpha val="12000"/>
               </a:srgbClr>
             </a:outerShdw>
           </a:effectLst>
         </p:spPr>
-        <p:txBody>
-          <a:bodyPr/>
-          <a:lstStyle/>
-          <a:p>
-            <a:endParaRPr lang="en-US"/>
-          </a:p>
-        </p:txBody>
       </p:sp>
       <p:sp>
         <p:nvSpPr>
@@ -3372,13 +3510,6 @@
           </a:solidFill>
           <a:ln/>
         </p:spPr>
-        <p:txBody>
-          <a:bodyPr/>
-          <a:lstStyle/>
-          <a:p>
-            <a:endParaRPr lang="en-US"/>
-          </a:p>
-        </p:txBody>
       </p:sp>
       <p:sp>
         <p:nvSpPr>
@@ -3401,7 +3532,7 @@
           <a:bodyPr wrap="square" lIns="0" tIns="0" rIns="0" bIns="0" rtlCol="0" anchor="ctr"/>
           <a:lstStyle/>
           <a:p>
-            <a:pPr marL="0" indent="0" algn="ctr">
+            <a:pPr algn="ctr" indent="0" marL="0">
               <a:buNone/>
             </a:pPr>
             <a:r>
@@ -3440,7 +3571,7 @@
           <a:bodyPr wrap="square" lIns="0" tIns="0" rIns="0" bIns="0" rtlCol="0" anchor="t"/>
           <a:lstStyle/>
           <a:p>
-            <a:pPr marL="0" indent="0" algn="ctr">
+            <a:pPr algn="ctr" indent="0" marL="0">
               <a:buNone/>
             </a:pPr>
             <a:r>
@@ -3457,7 +3588,7 @@
             <a:endParaRPr lang="en-US" sz="1100" dirty="0"/>
           </a:p>
           <a:p>
-            <a:pPr marL="0" indent="0" algn="ctr">
+            <a:pPr algn="ctr" indent="0" marL="0">
               <a:buNone/>
             </a:pPr>
             <a:r>
@@ -3496,7 +3627,7 @@
           <a:bodyPr wrap="square" lIns="0" tIns="0" rIns="0" bIns="0" rtlCol="0" anchor="ctr"/>
           <a:lstStyle/>
           <a:p>
-            <a:pPr marL="0" indent="0" algn="ctr">
+            <a:pPr algn="ctr" indent="0" marL="0">
               <a:buNone/>
             </a:pPr>
             <a:r>
@@ -3535,7 +3666,7 @@
           <a:bodyPr wrap="square" lIns="0" tIns="0" rIns="0" bIns="0" rtlCol="0" anchor="ctr"/>
           <a:lstStyle/>
           <a:p>
-            <a:pPr marL="0" indent="0" algn="ctr">
+            <a:pPr algn="ctr" indent="0" marL="0">
               <a:buNone/>
             </a:pPr>
             <a:r>
@@ -3574,7 +3705,7 @@
           <a:bodyPr wrap="square" lIns="0" tIns="0" rIns="0" bIns="0" rtlCol="0" anchor="ctr"/>
           <a:lstStyle/>
           <a:p>
-            <a:pPr marL="0" indent="0" algn="ctr">
+            <a:pPr algn="ctr" indent="0" marL="0">
               <a:buNone/>
             </a:pPr>
             <a:r>
@@ -3613,7 +3744,7 @@
           <a:bodyPr wrap="square" lIns="0" tIns="0" rIns="0" bIns="0" rtlCol="0" anchor="ctr"/>
           <a:lstStyle/>
           <a:p>
-            <a:pPr marL="0" indent="0" algn="ctr">
+            <a:pPr algn="ctr" indent="0" marL="0">
               <a:buNone/>
             </a:pPr>
             <a:r>
@@ -3652,7 +3783,7 @@
           <a:bodyPr wrap="square" lIns="0" tIns="0" rIns="0" bIns="0" rtlCol="0" anchor="ctr"/>
           <a:lstStyle/>
           <a:p>
-            <a:pPr marL="0" indent="0" algn="ctr">
+            <a:pPr algn="ctr" indent="0" marL="0">
               <a:buNone/>
             </a:pPr>
             <a:r>
@@ -3691,7 +3822,7 @@
           <a:bodyPr wrap="square" lIns="0" tIns="0" rIns="0" bIns="0" rtlCol="0" anchor="ctr"/>
           <a:lstStyle/>
           <a:p>
-            <a:pPr marL="0" indent="0" algn="ctr">
+            <a:pPr algn="ctr" indent="0" marL="0">
               <a:buNone/>
             </a:pPr>
             <a:r>
@@ -3730,7 +3861,7 @@
           <a:bodyPr wrap="square" lIns="0" tIns="0" rIns="0" bIns="0" rtlCol="0" anchor="ctr"/>
           <a:lstStyle/>
           <a:p>
-            <a:pPr marL="0" indent="0" algn="ctr">
+            <a:pPr algn="ctr" indent="0" marL="0">
               <a:buNone/>
             </a:pPr>
             <a:r>
@@ -3769,7 +3900,7 @@
           <a:bodyPr wrap="square" lIns="0" tIns="0" rIns="0" bIns="0" rtlCol="0" anchor="ctr"/>
           <a:lstStyle/>
           <a:p>
-            <a:pPr marL="0" indent="0" algn="ctr">
+            <a:pPr algn="ctr" indent="0" marL="0">
               <a:buNone/>
             </a:pPr>
             <a:r>
@@ -3808,7 +3939,7 @@
           <a:bodyPr wrap="square" rtlCol="0" anchor="ctr"/>
           <a:lstStyle/>
           <a:p>
-            <a:pPr marL="0" indent="0" algn="r">
+            <a:pPr algn="r" indent="0" marL="0">
               <a:buNone/>
             </a:pPr>
             <a:r>
@@ -3842,7 +3973,6 @@
         <a:solidFill>
           <a:srgbClr val="FAFAFA"/>
         </a:solidFill>
-        <a:effectLst/>
       </p:bgPr>
     </p:bg>
     <p:spTree>
@@ -3878,13 +4008,6 @@
           </a:solidFill>
           <a:ln/>
         </p:spPr>
-        <p:txBody>
-          <a:bodyPr/>
-          <a:lstStyle/>
-          <a:p>
-            <a:endParaRPr lang="en-US"/>
-          </a:p>
-        </p:txBody>
       </p:sp>
       <p:sp>
         <p:nvSpPr>
@@ -3907,7 +4030,7 @@
           <a:bodyPr wrap="square" lIns="0" tIns="0" rIns="0" bIns="0" rtlCol="0" anchor="ctr"/>
           <a:lstStyle/>
           <a:p>
-            <a:pPr marL="0" indent="0">
+            <a:pPr indent="0" marL="0">
               <a:buNone/>
             </a:pPr>
             <a:r>
@@ -3944,20 +4067,13 @@
           </a:solidFill>
           <a:ln/>
           <a:effectLst>
-            <a:outerShdw blurRad="50800" dist="12700" dir="8100000" algn="bl" rotWithShape="0">
+            <a:outerShdw sx="100000" sy="100000" kx="0" ky="0" algn="bl" rotWithShape="0" blurRad="50800" dist="12700" dir="8100000">
               <a:srgbClr val="000000">
                 <a:alpha val="8000"/>
               </a:srgbClr>
             </a:outerShdw>
           </a:effectLst>
         </p:spPr>
-        <p:txBody>
-          <a:bodyPr/>
-          <a:lstStyle/>
-          <a:p>
-            <a:endParaRPr lang="en-US"/>
-          </a:p>
-        </p:txBody>
       </p:sp>
       <p:sp>
         <p:nvSpPr>
@@ -3978,13 +4094,6 @@
           </a:solidFill>
           <a:ln/>
         </p:spPr>
-        <p:txBody>
-          <a:bodyPr/>
-          <a:lstStyle/>
-          <a:p>
-            <a:endParaRPr lang="en-US"/>
-          </a:p>
-        </p:txBody>
       </p:sp>
       <p:sp>
         <p:nvSpPr>
@@ -4007,7 +4116,7 @@
           <a:bodyPr wrap="square" lIns="0" tIns="0" rIns="0" bIns="0" rtlCol="0" anchor="ctr"/>
           <a:lstStyle/>
           <a:p>
-            <a:pPr marL="0" indent="0">
+            <a:pPr indent="0" marL="0">
               <a:buNone/>
             </a:pPr>
             <a:r>
@@ -4046,7 +4155,7 @@
           <a:bodyPr wrap="square" lIns="0" tIns="0" rIns="0" bIns="0" rtlCol="0" anchor="ctr"/>
           <a:lstStyle/>
           <a:p>
-            <a:pPr marL="0" indent="0">
+            <a:pPr indent="0" marL="0">
               <a:buNone/>
             </a:pPr>
             <a:r>
@@ -4083,20 +4192,13 @@
           </a:solidFill>
           <a:ln/>
           <a:effectLst>
-            <a:outerShdw blurRad="50800" dist="12700" dir="8100000" algn="bl" rotWithShape="0">
+            <a:outerShdw sx="100000" sy="100000" kx="0" ky="0" algn="bl" rotWithShape="0" blurRad="50800" dist="12700" dir="8100000">
               <a:srgbClr val="000000">
                 <a:alpha val="8000"/>
               </a:srgbClr>
             </a:outerShdw>
           </a:effectLst>
         </p:spPr>
-        <p:txBody>
-          <a:bodyPr/>
-          <a:lstStyle/>
-          <a:p>
-            <a:endParaRPr lang="en-US"/>
-          </a:p>
-        </p:txBody>
       </p:sp>
       <p:sp>
         <p:nvSpPr>
@@ -4117,13 +4219,6 @@
           </a:solidFill>
           <a:ln/>
         </p:spPr>
-        <p:txBody>
-          <a:bodyPr/>
-          <a:lstStyle/>
-          <a:p>
-            <a:endParaRPr lang="en-US"/>
-          </a:p>
-        </p:txBody>
       </p:sp>
       <p:sp>
         <p:nvSpPr>
@@ -4146,7 +4241,7 @@
           <a:bodyPr wrap="square" lIns="0" tIns="0" rIns="0" bIns="0" rtlCol="0" anchor="ctr"/>
           <a:lstStyle/>
           <a:p>
-            <a:pPr marL="0" indent="0">
+            <a:pPr indent="0" marL="0">
               <a:buNone/>
             </a:pPr>
             <a:r>
@@ -4185,7 +4280,7 @@
           <a:bodyPr wrap="square" lIns="0" tIns="0" rIns="0" bIns="0" rtlCol="0" anchor="ctr"/>
           <a:lstStyle/>
           <a:p>
-            <a:pPr marL="0" indent="0">
+            <a:pPr indent="0" marL="0">
               <a:buNone/>
             </a:pPr>
             <a:r>
@@ -4222,20 +4317,13 @@
           </a:solidFill>
           <a:ln/>
           <a:effectLst>
-            <a:outerShdw blurRad="50800" dist="12700" dir="8100000" algn="bl" rotWithShape="0">
+            <a:outerShdw sx="100000" sy="100000" kx="0" ky="0" algn="bl" rotWithShape="0" blurRad="50800" dist="12700" dir="8100000">
               <a:srgbClr val="000000">
                 <a:alpha val="8000"/>
               </a:srgbClr>
             </a:outerShdw>
           </a:effectLst>
         </p:spPr>
-        <p:txBody>
-          <a:bodyPr/>
-          <a:lstStyle/>
-          <a:p>
-            <a:endParaRPr lang="en-US"/>
-          </a:p>
-        </p:txBody>
       </p:sp>
       <p:sp>
         <p:nvSpPr>
@@ -4256,13 +4344,6 @@
           </a:solidFill>
           <a:ln/>
         </p:spPr>
-        <p:txBody>
-          <a:bodyPr/>
-          <a:lstStyle/>
-          <a:p>
-            <a:endParaRPr lang="en-US"/>
-          </a:p>
-        </p:txBody>
       </p:sp>
       <p:sp>
         <p:nvSpPr>
@@ -4285,7 +4366,7 @@
           <a:bodyPr wrap="square" lIns="0" tIns="0" rIns="0" bIns="0" rtlCol="0" anchor="ctr"/>
           <a:lstStyle/>
           <a:p>
-            <a:pPr marL="0" indent="0">
+            <a:pPr indent="0" marL="0">
               <a:buNone/>
             </a:pPr>
             <a:r>
@@ -4324,7 +4405,7 @@
           <a:bodyPr wrap="square" lIns="0" tIns="0" rIns="0" bIns="0" rtlCol="0" anchor="ctr"/>
           <a:lstStyle/>
           <a:p>
-            <a:pPr marL="0" indent="0">
+            <a:pPr indent="0" marL="0">
               <a:buNone/>
             </a:pPr>
             <a:r>
@@ -4361,20 +4442,13 @@
           </a:solidFill>
           <a:ln/>
           <a:effectLst>
-            <a:outerShdw blurRad="50800" dist="12700" dir="8100000" algn="bl" rotWithShape="0">
+            <a:outerShdw sx="100000" sy="100000" kx="0" ky="0" algn="bl" rotWithShape="0" blurRad="50800" dist="12700" dir="8100000">
               <a:srgbClr val="000000">
                 <a:alpha val="8000"/>
               </a:srgbClr>
             </a:outerShdw>
           </a:effectLst>
         </p:spPr>
-        <p:txBody>
-          <a:bodyPr/>
-          <a:lstStyle/>
-          <a:p>
-            <a:endParaRPr lang="en-US"/>
-          </a:p>
-        </p:txBody>
       </p:sp>
       <p:sp>
         <p:nvSpPr>
@@ -4395,13 +4469,6 @@
           </a:solidFill>
           <a:ln/>
         </p:spPr>
-        <p:txBody>
-          <a:bodyPr/>
-          <a:lstStyle/>
-          <a:p>
-            <a:endParaRPr lang="en-US"/>
-          </a:p>
-        </p:txBody>
       </p:sp>
       <p:sp>
         <p:nvSpPr>
@@ -4424,7 +4491,7 @@
           <a:bodyPr wrap="square" lIns="0" tIns="0" rIns="0" bIns="0" rtlCol="0" anchor="ctr"/>
           <a:lstStyle/>
           <a:p>
-            <a:pPr marL="0" indent="0">
+            <a:pPr indent="0" marL="0">
               <a:buNone/>
             </a:pPr>
             <a:r>
@@ -4463,7 +4530,7 @@
           <a:bodyPr wrap="square" lIns="0" tIns="0" rIns="0" bIns="0" rtlCol="0" anchor="ctr"/>
           <a:lstStyle/>
           <a:p>
-            <a:pPr marL="0" indent="0">
+            <a:pPr indent="0" marL="0">
               <a:buNone/>
             </a:pPr>
             <a:r>
@@ -4502,7 +4569,7 @@
           <a:bodyPr wrap="square" rtlCol="0" anchor="ctr"/>
           <a:lstStyle/>
           <a:p>
-            <a:pPr marL="0" indent="0" algn="r">
+            <a:pPr algn="r" indent="0" marL="0">
               <a:buNone/>
             </a:pPr>
             <a:r>
@@ -4536,7 +4603,6 @@
         <a:solidFill>
           <a:srgbClr val="FAFAFA"/>
         </a:solidFill>
-        <a:effectLst/>
       </p:bgPr>
     </p:bg>
     <p:spTree>
@@ -4572,13 +4638,6 @@
           </a:solidFill>
           <a:ln/>
         </p:spPr>
-        <p:txBody>
-          <a:bodyPr/>
-          <a:lstStyle/>
-          <a:p>
-            <a:endParaRPr lang="en-US"/>
-          </a:p>
-        </p:txBody>
       </p:sp>
       <p:sp>
         <p:nvSpPr>
@@ -4601,7 +4660,7 @@
           <a:bodyPr wrap="square" lIns="0" tIns="0" rIns="0" bIns="0" rtlCol="0" anchor="ctr"/>
           <a:lstStyle/>
           <a:p>
-            <a:pPr marL="0" indent="0">
+            <a:pPr indent="0" marL="0">
               <a:buNone/>
             </a:pPr>
             <a:r>
@@ -4638,20 +4697,13 @@
           </a:solidFill>
           <a:ln/>
           <a:effectLst>
-            <a:outerShdw blurRad="50800" dist="12700" dir="8100000" algn="bl" rotWithShape="0">
+            <a:outerShdw sx="100000" sy="100000" kx="0" ky="0" algn="bl" rotWithShape="0" blurRad="50800" dist="12700" dir="8100000">
               <a:srgbClr val="000000">
                 <a:alpha val="8000"/>
               </a:srgbClr>
             </a:outerShdw>
           </a:effectLst>
         </p:spPr>
-        <p:txBody>
-          <a:bodyPr/>
-          <a:lstStyle/>
-          <a:p>
-            <a:endParaRPr lang="en-US"/>
-          </a:p>
-        </p:txBody>
       </p:sp>
       <p:sp>
         <p:nvSpPr>
@@ -4672,13 +4724,6 @@
           </a:solidFill>
           <a:ln/>
         </p:spPr>
-        <p:txBody>
-          <a:bodyPr/>
-          <a:lstStyle/>
-          <a:p>
-            <a:endParaRPr lang="en-US"/>
-          </a:p>
-        </p:txBody>
       </p:sp>
       <p:sp>
         <p:nvSpPr>
@@ -4701,7 +4746,7 @@
           <a:bodyPr wrap="square" lIns="0" tIns="0" rIns="0" bIns="0" rtlCol="0" anchor="ctr"/>
           <a:lstStyle/>
           <a:p>
-            <a:pPr marL="0" indent="0">
+            <a:pPr indent="0" marL="0">
               <a:buNone/>
             </a:pPr>
             <a:r>
@@ -4740,7 +4785,7 @@
           <a:bodyPr wrap="square" lIns="0" tIns="0" rIns="0" bIns="0" rtlCol="0" anchor="ctr"/>
           <a:lstStyle/>
           <a:p>
-            <a:pPr marL="0" indent="0">
+            <a:pPr indent="0" marL="0">
               <a:buNone/>
             </a:pPr>
             <a:r>
@@ -4757,7 +4802,7 @@
             <a:endParaRPr lang="en-US" sz="1100" dirty="0"/>
           </a:p>
           <a:p>
-            <a:pPr marL="0" indent="0">
+            <a:pPr indent="0" marL="0">
               <a:buNone/>
             </a:pPr>
             <a:r>
@@ -4774,7 +4819,7 @@
             <a:endParaRPr lang="en-US" sz="1100" dirty="0"/>
           </a:p>
           <a:p>
-            <a:pPr marL="0" indent="0">
+            <a:pPr indent="0" marL="0">
               <a:buNone/>
             </a:pPr>
             <a:r>
@@ -4791,13 +4836,13 @@
             <a:endParaRPr lang="en-US" sz="1100" dirty="0"/>
           </a:p>
           <a:p>
-            <a:pPr marL="0" indent="0">
+            <a:pPr indent="0" marL="0">
               <a:buNone/>
             </a:pPr>
             <a:endParaRPr lang="en-US" sz="1100" dirty="0"/>
           </a:p>
           <a:p>
-            <a:pPr marL="0" indent="0">
+            <a:pPr indent="0" marL="0">
               <a:buNone/>
             </a:pPr>
             <a:r>
@@ -4814,7 +4859,7 @@
             <a:endParaRPr lang="en-US" sz="1100" dirty="0"/>
           </a:p>
           <a:p>
-            <a:pPr marL="0" indent="0">
+            <a:pPr indent="0" marL="0">
               <a:buNone/>
             </a:pPr>
             <a:r>
@@ -4831,7 +4876,7 @@
             <a:endParaRPr lang="en-US" sz="1100" dirty="0"/>
           </a:p>
           <a:p>
-            <a:pPr marL="0" indent="0">
+            <a:pPr indent="0" marL="0">
               <a:buNone/>
             </a:pPr>
             <a:r>
@@ -4868,20 +4913,13 @@
           </a:solidFill>
           <a:ln/>
           <a:effectLst>
-            <a:outerShdw blurRad="50800" dist="12700" dir="8100000" algn="bl" rotWithShape="0">
+            <a:outerShdw sx="100000" sy="100000" kx="0" ky="0" algn="bl" rotWithShape="0" blurRad="50800" dist="12700" dir="8100000">
               <a:srgbClr val="000000">
                 <a:alpha val="8000"/>
               </a:srgbClr>
             </a:outerShdw>
           </a:effectLst>
         </p:spPr>
-        <p:txBody>
-          <a:bodyPr/>
-          <a:lstStyle/>
-          <a:p>
-            <a:endParaRPr lang="en-US"/>
-          </a:p>
-        </p:txBody>
       </p:sp>
       <p:sp>
         <p:nvSpPr>
@@ -4902,13 +4940,6 @@
           </a:solidFill>
           <a:ln/>
         </p:spPr>
-        <p:txBody>
-          <a:bodyPr/>
-          <a:lstStyle/>
-          <a:p>
-            <a:endParaRPr lang="en-US"/>
-          </a:p>
-        </p:txBody>
       </p:sp>
       <p:sp>
         <p:nvSpPr>
@@ -4931,7 +4962,7 @@
           <a:bodyPr wrap="square" lIns="0" tIns="0" rIns="0" bIns="0" rtlCol="0" anchor="ctr"/>
           <a:lstStyle/>
           <a:p>
-            <a:pPr marL="0" indent="0">
+            <a:pPr indent="0" marL="0">
               <a:buNone/>
             </a:pPr>
             <a:r>
@@ -4970,7 +5001,7 @@
           <a:bodyPr wrap="square" lIns="0" tIns="0" rIns="0" bIns="0" rtlCol="0" anchor="ctr"/>
           <a:lstStyle/>
           <a:p>
-            <a:pPr marL="0" indent="0">
+            <a:pPr indent="0" marL="0">
               <a:spcAft>
                 <a:spcPts val="800"/>
               </a:spcAft>
@@ -4990,7 +5021,7 @@
             <a:endParaRPr lang="en-US" sz="1100" dirty="0"/>
           </a:p>
           <a:p>
-            <a:pPr marL="0" indent="0">
+            <a:pPr indent="0" marL="0">
               <a:spcAft>
                 <a:spcPts val="800"/>
               </a:spcAft>
@@ -5010,7 +5041,7 @@
             <a:endParaRPr lang="en-US" sz="1100" dirty="0"/>
           </a:p>
           <a:p>
-            <a:pPr marL="0" indent="0">
+            <a:pPr indent="0" marL="0">
               <a:spcAft>
                 <a:spcPts val="800"/>
               </a:spcAft>
@@ -5030,7 +5061,7 @@
             <a:endParaRPr lang="en-US" sz="1100" dirty="0"/>
           </a:p>
           <a:p>
-            <a:pPr marL="0" indent="0">
+            <a:pPr indent="0" marL="0">
               <a:spcAft>
                 <a:spcPts val="800"/>
               </a:spcAft>
@@ -5050,7 +5081,7 @@
             <a:endParaRPr lang="en-US" sz="1100" dirty="0"/>
           </a:p>
           <a:p>
-            <a:pPr marL="0" indent="0">
+            <a:pPr indent="0" marL="0">
               <a:spcAft>
                 <a:spcPts val="800"/>
               </a:spcAft>
@@ -5092,7 +5123,7 @@
           <a:bodyPr wrap="square" rtlCol="0" anchor="ctr"/>
           <a:lstStyle/>
           <a:p>
-            <a:pPr marL="0" indent="0" algn="r">
+            <a:pPr algn="r" indent="0" marL="0">
               <a:buNone/>
             </a:pPr>
             <a:r>
@@ -5126,7 +5157,6 @@
         <a:solidFill>
           <a:srgbClr val="1B5E20"/>
         </a:solidFill>
-        <a:effectLst/>
       </p:bgPr>
     </p:bg>
     <p:spTree>
@@ -5162,13 +5192,6 @@
           </a:solidFill>
           <a:ln/>
         </p:spPr>
-        <p:txBody>
-          <a:bodyPr/>
-          <a:lstStyle/>
-          <a:p>
-            <a:endParaRPr lang="en-US"/>
-          </a:p>
-        </p:txBody>
       </p:sp>
       <p:sp>
         <p:nvSpPr>
@@ -5191,7 +5214,7 @@
           <a:bodyPr wrap="square" lIns="0" tIns="0" rIns="0" bIns="0" rtlCol="0" anchor="ctr"/>
           <a:lstStyle/>
           <a:p>
-            <a:pPr marL="0" indent="0">
+            <a:pPr indent="0" marL="0">
               <a:buNone/>
             </a:pPr>
             <a:r>
@@ -5228,20 +5251,13 @@
           </a:solidFill>
           <a:ln/>
           <a:effectLst>
-            <a:outerShdw blurRad="76200" dist="25400" dir="8100000" algn="bl" rotWithShape="0">
+            <a:outerShdw sx="100000" sy="100000" kx="0" ky="0" algn="bl" rotWithShape="0" blurRad="76200" dist="25400" dir="8100000">
               <a:srgbClr val="000000">
                 <a:alpha val="12000"/>
               </a:srgbClr>
             </a:outerShdw>
           </a:effectLst>
         </p:spPr>
-        <p:txBody>
-          <a:bodyPr/>
-          <a:lstStyle/>
-          <a:p>
-            <a:endParaRPr lang="en-US"/>
-          </a:p>
-        </p:txBody>
       </p:sp>
       <p:sp>
         <p:nvSpPr>
@@ -5262,13 +5278,6 @@
           </a:solidFill>
           <a:ln/>
         </p:spPr>
-        <p:txBody>
-          <a:bodyPr/>
-          <a:lstStyle/>
-          <a:p>
-            <a:endParaRPr lang="en-US"/>
-          </a:p>
-        </p:txBody>
       </p:sp>
       <p:sp>
         <p:nvSpPr>
@@ -5291,7 +5300,7 @@
           <a:bodyPr wrap="square" lIns="0" tIns="0" rIns="0" bIns="0" rtlCol="0" anchor="ctr"/>
           <a:lstStyle/>
           <a:p>
-            <a:pPr marL="0" indent="0">
+            <a:pPr indent="0" marL="0">
               <a:buNone/>
             </a:pPr>
             <a:r>
@@ -5330,7 +5339,7 @@
           <a:bodyPr wrap="square" lIns="0" tIns="0" rIns="0" bIns="0" rtlCol="0" anchor="ctr"/>
           <a:lstStyle/>
           <a:p>
-            <a:pPr marL="0" indent="0">
+            <a:pPr indent="0" marL="0">
               <a:buNone/>
             </a:pPr>
             <a:r>
@@ -5367,20 +5376,13 @@
           </a:solidFill>
           <a:ln/>
           <a:effectLst>
-            <a:outerShdw blurRad="76200" dist="25400" dir="8100000" algn="bl" rotWithShape="0">
+            <a:outerShdw sx="100000" sy="100000" kx="0" ky="0" algn="bl" rotWithShape="0" blurRad="76200" dist="25400" dir="8100000">
               <a:srgbClr val="000000">
                 <a:alpha val="12000"/>
               </a:srgbClr>
             </a:outerShdw>
           </a:effectLst>
         </p:spPr>
-        <p:txBody>
-          <a:bodyPr/>
-          <a:lstStyle/>
-          <a:p>
-            <a:endParaRPr lang="en-US"/>
-          </a:p>
-        </p:txBody>
       </p:sp>
       <p:sp>
         <p:nvSpPr>
@@ -5401,13 +5403,6 @@
           </a:solidFill>
           <a:ln/>
         </p:spPr>
-        <p:txBody>
-          <a:bodyPr/>
-          <a:lstStyle/>
-          <a:p>
-            <a:endParaRPr lang="en-US"/>
-          </a:p>
-        </p:txBody>
       </p:sp>
       <p:sp>
         <p:nvSpPr>
@@ -5430,7 +5425,7 @@
           <a:bodyPr wrap="square" lIns="0" tIns="0" rIns="0" bIns="0" rtlCol="0" anchor="ctr"/>
           <a:lstStyle/>
           <a:p>
-            <a:pPr marL="0" indent="0">
+            <a:pPr indent="0" marL="0">
               <a:buNone/>
             </a:pPr>
             <a:r>
@@ -5469,7 +5464,7 @@
           <a:bodyPr wrap="square" lIns="0" tIns="0" rIns="0" bIns="0" rtlCol="0" anchor="ctr"/>
           <a:lstStyle/>
           <a:p>
-            <a:pPr marL="0" indent="0">
+            <a:pPr indent="0" marL="0">
               <a:buNone/>
             </a:pPr>
             <a:r>
@@ -5506,20 +5501,13 @@
           </a:solidFill>
           <a:ln/>
           <a:effectLst>
-            <a:outerShdw blurRad="76200" dist="25400" dir="8100000" algn="bl" rotWithShape="0">
+            <a:outerShdw sx="100000" sy="100000" kx="0" ky="0" algn="bl" rotWithShape="0" blurRad="76200" dist="25400" dir="8100000">
               <a:srgbClr val="000000">
                 <a:alpha val="12000"/>
               </a:srgbClr>
             </a:outerShdw>
           </a:effectLst>
         </p:spPr>
-        <p:txBody>
-          <a:bodyPr/>
-          <a:lstStyle/>
-          <a:p>
-            <a:endParaRPr lang="en-US"/>
-          </a:p>
-        </p:txBody>
       </p:sp>
       <p:sp>
         <p:nvSpPr>
@@ -5540,13 +5528,6 @@
           </a:solidFill>
           <a:ln/>
         </p:spPr>
-        <p:txBody>
-          <a:bodyPr/>
-          <a:lstStyle/>
-          <a:p>
-            <a:endParaRPr lang="en-US"/>
-          </a:p>
-        </p:txBody>
       </p:sp>
       <p:sp>
         <p:nvSpPr>
@@ -5569,7 +5550,7 @@
           <a:bodyPr wrap="square" lIns="0" tIns="0" rIns="0" bIns="0" rtlCol="0" anchor="ctr"/>
           <a:lstStyle/>
           <a:p>
-            <a:pPr marL="0" indent="0">
+            <a:pPr indent="0" marL="0">
               <a:buNone/>
             </a:pPr>
             <a:r>
@@ -5608,7 +5589,7 @@
           <a:bodyPr wrap="square" lIns="0" tIns="0" rIns="0" bIns="0" rtlCol="0" anchor="ctr"/>
           <a:lstStyle/>
           <a:p>
-            <a:pPr marL="0" indent="0">
+            <a:pPr indent="0" marL="0">
               <a:buNone/>
             </a:pPr>
             <a:r>
@@ -5645,20 +5626,13 @@
           </a:solidFill>
           <a:ln/>
           <a:effectLst>
-            <a:outerShdw blurRad="76200" dist="25400" dir="8100000" algn="bl" rotWithShape="0">
+            <a:outerShdw sx="100000" sy="100000" kx="0" ky="0" algn="bl" rotWithShape="0" blurRad="76200" dist="25400" dir="8100000">
               <a:srgbClr val="000000">
                 <a:alpha val="12000"/>
               </a:srgbClr>
             </a:outerShdw>
           </a:effectLst>
         </p:spPr>
-        <p:txBody>
-          <a:bodyPr/>
-          <a:lstStyle/>
-          <a:p>
-            <a:endParaRPr lang="en-US"/>
-          </a:p>
-        </p:txBody>
       </p:sp>
       <p:sp>
         <p:nvSpPr>
@@ -5679,13 +5653,6 @@
           </a:solidFill>
           <a:ln/>
         </p:spPr>
-        <p:txBody>
-          <a:bodyPr/>
-          <a:lstStyle/>
-          <a:p>
-            <a:endParaRPr lang="en-US"/>
-          </a:p>
-        </p:txBody>
       </p:sp>
       <p:sp>
         <p:nvSpPr>
@@ -5708,7 +5675,7 @@
           <a:bodyPr wrap="square" lIns="0" tIns="0" rIns="0" bIns="0" rtlCol="0" anchor="ctr"/>
           <a:lstStyle/>
           <a:p>
-            <a:pPr marL="0" indent="0">
+            <a:pPr indent="0" marL="0">
               <a:buNone/>
             </a:pPr>
             <a:r>
@@ -5747,7 +5714,7 @@
           <a:bodyPr wrap="square" lIns="0" tIns="0" rIns="0" bIns="0" rtlCol="0" anchor="ctr"/>
           <a:lstStyle/>
           <a:p>
-            <a:pPr marL="0" indent="0">
+            <a:pPr indent="0" marL="0">
               <a:buNone/>
             </a:pPr>
             <a:r>
@@ -5784,20 +5751,13 @@
           </a:solidFill>
           <a:ln/>
           <a:effectLst>
-            <a:outerShdw blurRad="76200" dist="25400" dir="8100000" algn="bl" rotWithShape="0">
+            <a:outerShdw sx="100000" sy="100000" kx="0" ky="0" algn="bl" rotWithShape="0" blurRad="76200" dist="25400" dir="8100000">
               <a:srgbClr val="000000">
                 <a:alpha val="12000"/>
               </a:srgbClr>
             </a:outerShdw>
           </a:effectLst>
         </p:spPr>
-        <p:txBody>
-          <a:bodyPr/>
-          <a:lstStyle/>
-          <a:p>
-            <a:endParaRPr lang="en-US"/>
-          </a:p>
-        </p:txBody>
       </p:sp>
       <p:sp>
         <p:nvSpPr>
@@ -5818,13 +5778,6 @@
           </a:solidFill>
           <a:ln/>
         </p:spPr>
-        <p:txBody>
-          <a:bodyPr/>
-          <a:lstStyle/>
-          <a:p>
-            <a:endParaRPr lang="en-US"/>
-          </a:p>
-        </p:txBody>
       </p:sp>
       <p:sp>
         <p:nvSpPr>
@@ -5847,7 +5800,7 @@
           <a:bodyPr wrap="square" lIns="0" tIns="0" rIns="0" bIns="0" rtlCol="0" anchor="ctr"/>
           <a:lstStyle/>
           <a:p>
-            <a:pPr marL="0" indent="0">
+            <a:pPr indent="0" marL="0">
               <a:buNone/>
             </a:pPr>
             <a:r>
@@ -5886,7 +5839,7 @@
           <a:bodyPr wrap="square" lIns="0" tIns="0" rIns="0" bIns="0" rtlCol="0" anchor="ctr"/>
           <a:lstStyle/>
           <a:p>
-            <a:pPr marL="0" indent="0">
+            <a:pPr indent="0" marL="0">
               <a:buNone/>
             </a:pPr>
             <a:r>
@@ -5925,7 +5878,7 @@
           <a:bodyPr wrap="square" rtlCol="0" anchor="ctr"/>
           <a:lstStyle/>
           <a:p>
-            <a:pPr marL="0" indent="0" algn="r">
+            <a:pPr algn="r" indent="0" marL="0">
               <a:buNone/>
             </a:pPr>
             <a:r>
@@ -5959,7 +5912,6 @@
         <a:solidFill>
           <a:srgbClr val="1B5E20"/>
         </a:solidFill>
-        <a:effectLst/>
       </p:bgPr>
     </p:bg>
     <p:spTree>
@@ -5995,13 +5947,6 @@
           </a:solidFill>
           <a:ln/>
         </p:spPr>
-        <p:txBody>
-          <a:bodyPr/>
-          <a:lstStyle/>
-          <a:p>
-            <a:endParaRPr lang="en-US"/>
-          </a:p>
-        </p:txBody>
       </p:sp>
       <p:sp>
         <p:nvSpPr>
@@ -6024,11 +5969,11 @@
           <a:bodyPr wrap="square" lIns="0" tIns="0" rIns="0" bIns="0" rtlCol="0" anchor="ctr"/>
           <a:lstStyle/>
           <a:p>
-            <a:pPr marL="0" indent="0" algn="ctr">
-              <a:buNone/>
-            </a:pPr>
-            <a:r>
-              <a:rPr lang="en-US" sz="7200" b="1" kern="0" spc="800" dirty="0">
+            <a:pPr algn="ctr" indent="0" marL="0">
+              <a:buNone/>
+            </a:pPr>
+            <a:r>
+              <a:rPr lang="en-US" sz="7200" b="1" spc="800" kern="0" dirty="0">
                 <a:solidFill>
                   <a:srgbClr val="FFFFFF"/>
                 </a:solidFill>
@@ -6063,7 +6008,7 @@
           <a:bodyPr wrap="square" lIns="0" tIns="0" rIns="0" bIns="0" rtlCol="0" anchor="ctr"/>
           <a:lstStyle/>
           <a:p>
-            <a:pPr marL="0" indent="0" algn="ctr">
+            <a:pPr algn="ctr" indent="0" marL="0">
               <a:buNone/>
             </a:pPr>
             <a:r>
@@ -6103,13 +6048,6 @@
             <a:prstDash val="solid"/>
           </a:ln>
         </p:spPr>
-        <p:txBody>
-          <a:bodyPr/>
-          <a:lstStyle/>
-          <a:p>
-            <a:endParaRPr lang="en-US"/>
-          </a:p>
-        </p:txBody>
       </p:sp>
       <p:sp>
         <p:nvSpPr>
@@ -6132,7 +6070,7 @@
           <a:bodyPr wrap="square" lIns="0" tIns="0" rIns="0" bIns="0" rtlCol="0" anchor="ctr"/>
           <a:lstStyle/>
           <a:p>
-            <a:pPr marL="0" indent="0" algn="ctr">
+            <a:pPr algn="ctr" indent="0" marL="0">
               <a:buNone/>
             </a:pPr>
             <a:r>
@@ -6171,7 +6109,7 @@
           <a:bodyPr wrap="square" lIns="0" tIns="0" rIns="0" bIns="0" rtlCol="0" anchor="ctr"/>
           <a:lstStyle/>
           <a:p>
-            <a:pPr marL="0" indent="0" algn="ctr">
+            <a:pPr algn="ctr" indent="0" marL="0">
               <a:buNone/>
             </a:pPr>
             <a:r>
@@ -6208,13 +6146,6 @@
           </a:solidFill>
           <a:ln/>
         </p:spPr>
-        <p:txBody>
-          <a:bodyPr/>
-          <a:lstStyle/>
-          <a:p>
-            <a:endParaRPr lang="en-US"/>
-          </a:p>
-        </p:txBody>
       </p:sp>
     </p:spTree>
   </p:cSld>
@@ -6232,7 +6163,6 @@
         <a:solidFill>
           <a:srgbClr val="FAFAFA"/>
         </a:solidFill>
-        <a:effectLst/>
       </p:bgPr>
     </p:bg>
     <p:spTree>
@@ -6268,13 +6198,6 @@
           </a:solidFill>
           <a:ln/>
         </p:spPr>
-        <p:txBody>
-          <a:bodyPr/>
-          <a:lstStyle/>
-          <a:p>
-            <a:endParaRPr lang="en-US"/>
-          </a:p>
-        </p:txBody>
       </p:sp>
       <p:sp>
         <p:nvSpPr>
@@ -6297,7 +6220,7 @@
           <a:bodyPr wrap="square" lIns="0" tIns="0" rIns="0" bIns="0" rtlCol="0" anchor="ctr"/>
           <a:lstStyle/>
           <a:p>
-            <a:pPr marL="0" indent="0">
+            <a:pPr indent="0" marL="0">
               <a:buNone/>
             </a:pPr>
             <a:r>
@@ -6336,7 +6259,7 @@
           <a:bodyPr wrap="square" lIns="0" tIns="0" rIns="0" bIns="0" rtlCol="0" anchor="ctr"/>
           <a:lstStyle/>
           <a:p>
-            <a:pPr marL="0" indent="0">
+            <a:pPr indent="0" marL="0">
               <a:buNone/>
             </a:pPr>
             <a:r>
@@ -6373,20 +6296,13 @@
           </a:solidFill>
           <a:ln/>
           <a:effectLst>
-            <a:outerShdw blurRad="50800" dist="12700" dir="8100000" algn="bl" rotWithShape="0">
+            <a:outerShdw sx="100000" sy="100000" kx="0" ky="0" algn="bl" rotWithShape="0" blurRad="50800" dist="12700" dir="8100000">
               <a:srgbClr val="000000">
                 <a:alpha val="8000"/>
               </a:srgbClr>
             </a:outerShdw>
           </a:effectLst>
         </p:spPr>
-        <p:txBody>
-          <a:bodyPr/>
-          <a:lstStyle/>
-          <a:p>
-            <a:endParaRPr lang="en-US"/>
-          </a:p>
-        </p:txBody>
       </p:sp>
       <p:sp>
         <p:nvSpPr>
@@ -6407,13 +6323,6 @@
           </a:solidFill>
           <a:ln/>
         </p:spPr>
-        <p:txBody>
-          <a:bodyPr/>
-          <a:lstStyle/>
-          <a:p>
-            <a:endParaRPr lang="en-US"/>
-          </a:p>
-        </p:txBody>
       </p:sp>
       <p:sp>
         <p:nvSpPr>
@@ -6436,7 +6345,7 @@
           <a:bodyPr wrap="square" lIns="0" tIns="0" rIns="0" bIns="0" rtlCol="0" anchor="ctr"/>
           <a:lstStyle/>
           <a:p>
-            <a:pPr marL="0" indent="0">
+            <a:pPr indent="0" marL="0">
               <a:buNone/>
             </a:pPr>
             <a:r>
@@ -6475,7 +6384,7 @@
           <a:bodyPr wrap="square" lIns="0" tIns="0" rIns="0" bIns="0" rtlCol="0" anchor="ctr"/>
           <a:lstStyle/>
           <a:p>
-            <a:pPr marL="0" indent="0">
+            <a:pPr indent="0" marL="0">
               <a:buNone/>
             </a:pPr>
             <a:r>
@@ -6512,20 +6421,13 @@
           </a:solidFill>
           <a:ln/>
           <a:effectLst>
-            <a:outerShdw blurRad="50800" dist="12700" dir="8100000" algn="bl" rotWithShape="0">
+            <a:outerShdw sx="100000" sy="100000" kx="0" ky="0" algn="bl" rotWithShape="0" blurRad="50800" dist="12700" dir="8100000">
               <a:srgbClr val="000000">
                 <a:alpha val="8000"/>
               </a:srgbClr>
             </a:outerShdw>
           </a:effectLst>
         </p:spPr>
-        <p:txBody>
-          <a:bodyPr/>
-          <a:lstStyle/>
-          <a:p>
-            <a:endParaRPr lang="en-US"/>
-          </a:p>
-        </p:txBody>
       </p:sp>
       <p:sp>
         <p:nvSpPr>
@@ -6546,13 +6448,6 @@
           </a:solidFill>
           <a:ln/>
         </p:spPr>
-        <p:txBody>
-          <a:bodyPr/>
-          <a:lstStyle/>
-          <a:p>
-            <a:endParaRPr lang="en-US"/>
-          </a:p>
-        </p:txBody>
       </p:sp>
       <p:sp>
         <p:nvSpPr>
@@ -6575,7 +6470,7 @@
           <a:bodyPr wrap="square" lIns="0" tIns="0" rIns="0" bIns="0" rtlCol="0" anchor="ctr"/>
           <a:lstStyle/>
           <a:p>
-            <a:pPr marL="0" indent="0">
+            <a:pPr indent="0" marL="0">
               <a:buNone/>
             </a:pPr>
             <a:r>
@@ -6614,7 +6509,7 @@
           <a:bodyPr wrap="square" lIns="0" tIns="0" rIns="0" bIns="0" rtlCol="0" anchor="ctr"/>
           <a:lstStyle/>
           <a:p>
-            <a:pPr marL="0" indent="0">
+            <a:pPr indent="0" marL="0">
               <a:buNone/>
             </a:pPr>
             <a:r>
@@ -6651,20 +6546,13 @@
           </a:solidFill>
           <a:ln/>
           <a:effectLst>
-            <a:outerShdw blurRad="50800" dist="12700" dir="8100000" algn="bl" rotWithShape="0">
+            <a:outerShdw sx="100000" sy="100000" kx="0" ky="0" algn="bl" rotWithShape="0" blurRad="50800" dist="12700" dir="8100000">
               <a:srgbClr val="000000">
                 <a:alpha val="8000"/>
               </a:srgbClr>
             </a:outerShdw>
           </a:effectLst>
         </p:spPr>
-        <p:txBody>
-          <a:bodyPr/>
-          <a:lstStyle/>
-          <a:p>
-            <a:endParaRPr lang="en-US"/>
-          </a:p>
-        </p:txBody>
       </p:sp>
       <p:sp>
         <p:nvSpPr>
@@ -6685,13 +6573,6 @@
           </a:solidFill>
           <a:ln/>
         </p:spPr>
-        <p:txBody>
-          <a:bodyPr/>
-          <a:lstStyle/>
-          <a:p>
-            <a:endParaRPr lang="en-US"/>
-          </a:p>
-        </p:txBody>
       </p:sp>
       <p:sp>
         <p:nvSpPr>
@@ -6714,7 +6595,7 @@
           <a:bodyPr wrap="square" lIns="0" tIns="0" rIns="0" bIns="0" rtlCol="0" anchor="ctr"/>
           <a:lstStyle/>
           <a:p>
-            <a:pPr marL="0" indent="0">
+            <a:pPr indent="0" marL="0">
               <a:buNone/>
             </a:pPr>
             <a:r>
@@ -6753,7 +6634,7 @@
           <a:bodyPr wrap="square" lIns="0" tIns="0" rIns="0" bIns="0" rtlCol="0" anchor="ctr"/>
           <a:lstStyle/>
           <a:p>
-            <a:pPr marL="0" indent="0">
+            <a:pPr indent="0" marL="0">
               <a:buNone/>
             </a:pPr>
             <a:r>
@@ -6790,20 +6671,13 @@
           </a:solidFill>
           <a:ln/>
           <a:effectLst>
-            <a:outerShdw blurRad="50800" dist="12700" dir="8100000" algn="bl" rotWithShape="0">
+            <a:outerShdw sx="100000" sy="100000" kx="0" ky="0" algn="bl" rotWithShape="0" blurRad="50800" dist="12700" dir="8100000">
               <a:srgbClr val="000000">
                 <a:alpha val="8000"/>
               </a:srgbClr>
             </a:outerShdw>
           </a:effectLst>
         </p:spPr>
-        <p:txBody>
-          <a:bodyPr/>
-          <a:lstStyle/>
-          <a:p>
-            <a:endParaRPr lang="en-US"/>
-          </a:p>
-        </p:txBody>
       </p:sp>
       <p:sp>
         <p:nvSpPr>
@@ -6824,13 +6698,6 @@
           </a:solidFill>
           <a:ln/>
         </p:spPr>
-        <p:txBody>
-          <a:bodyPr/>
-          <a:lstStyle/>
-          <a:p>
-            <a:endParaRPr lang="en-US"/>
-          </a:p>
-        </p:txBody>
       </p:sp>
       <p:sp>
         <p:nvSpPr>
@@ -6853,7 +6720,7 @@
           <a:bodyPr wrap="square" lIns="0" tIns="0" rIns="0" bIns="0" rtlCol="0" anchor="ctr"/>
           <a:lstStyle/>
           <a:p>
-            <a:pPr marL="0" indent="0">
+            <a:pPr indent="0" marL="0">
               <a:buNone/>
             </a:pPr>
             <a:r>
@@ -6892,7 +6759,7 @@
           <a:bodyPr wrap="square" lIns="0" tIns="0" rIns="0" bIns="0" rtlCol="0" anchor="ctr"/>
           <a:lstStyle/>
           <a:p>
-            <a:pPr marL="0" indent="0">
+            <a:pPr indent="0" marL="0">
               <a:buNone/>
             </a:pPr>
             <a:r>
@@ -6931,7 +6798,7 @@
           <a:bodyPr wrap="square" rtlCol="0" anchor="ctr"/>
           <a:lstStyle/>
           <a:p>
-            <a:pPr marL="0" indent="0" algn="r">
+            <a:pPr algn="r" indent="0" marL="0">
               <a:buNone/>
             </a:pPr>
             <a:r>
@@ -6965,7 +6832,6 @@
         <a:solidFill>
           <a:srgbClr val="1B5E20"/>
         </a:solidFill>
-        <a:effectLst/>
       </p:bgPr>
     </p:bg>
     <p:spTree>
@@ -7001,13 +6867,6 @@
           </a:solidFill>
           <a:ln/>
         </p:spPr>
-        <p:txBody>
-          <a:bodyPr/>
-          <a:lstStyle/>
-          <a:p>
-            <a:endParaRPr lang="en-US"/>
-          </a:p>
-        </p:txBody>
       </p:sp>
       <p:sp>
         <p:nvSpPr>
@@ -7030,7 +6889,7 @@
           <a:bodyPr wrap="square" lIns="0" tIns="0" rIns="0" bIns="0" rtlCol="0" anchor="ctr"/>
           <a:lstStyle/>
           <a:p>
-            <a:pPr marL="0" indent="0">
+            <a:pPr indent="0" marL="0">
               <a:buNone/>
             </a:pPr>
             <a:r>
@@ -7069,7 +6928,7 @@
           <a:bodyPr wrap="square" lIns="0" tIns="0" rIns="0" bIns="0" rtlCol="0" anchor="ctr"/>
           <a:lstStyle/>
           <a:p>
-            <a:pPr marL="0" indent="0">
+            <a:pPr indent="0" marL="0">
               <a:buNone/>
             </a:pPr>
             <a:r>
@@ -7106,20 +6965,13 @@
           </a:solidFill>
           <a:ln/>
           <a:effectLst>
-            <a:outerShdw blurRad="76200" dist="25400" dir="8100000" algn="bl" rotWithShape="0">
+            <a:outerShdw sx="100000" sy="100000" kx="0" ky="0" algn="bl" rotWithShape="0" blurRad="76200" dist="25400" dir="8100000">
               <a:srgbClr val="000000">
                 <a:alpha val="12000"/>
               </a:srgbClr>
             </a:outerShdw>
           </a:effectLst>
         </p:spPr>
-        <p:txBody>
-          <a:bodyPr/>
-          <a:lstStyle/>
-          <a:p>
-            <a:endParaRPr lang="en-US"/>
-          </a:p>
-        </p:txBody>
       </p:sp>
       <p:sp>
         <p:nvSpPr>
@@ -7140,13 +6992,6 @@
           </a:solidFill>
           <a:ln/>
         </p:spPr>
-        <p:txBody>
-          <a:bodyPr/>
-          <a:lstStyle/>
-          <a:p>
-            <a:endParaRPr lang="en-US"/>
-          </a:p>
-        </p:txBody>
       </p:sp>
       <p:sp>
         <p:nvSpPr>
@@ -7169,7 +7014,7 @@
           <a:bodyPr wrap="square" lIns="0" tIns="0" rIns="0" bIns="0" rtlCol="0" anchor="ctr"/>
           <a:lstStyle/>
           <a:p>
-            <a:pPr marL="0" indent="0">
+            <a:pPr indent="0" marL="0">
               <a:buNone/>
             </a:pPr>
             <a:r>
@@ -7208,7 +7053,7 @@
           <a:bodyPr wrap="square" lIns="0" tIns="0" rIns="0" bIns="0" rtlCol="0" anchor="ctr"/>
           <a:lstStyle/>
           <a:p>
-            <a:pPr marL="0" indent="0">
+            <a:pPr indent="0" marL="0">
               <a:buNone/>
             </a:pPr>
             <a:r>
@@ -7245,20 +7090,13 @@
           </a:solidFill>
           <a:ln/>
           <a:effectLst>
-            <a:outerShdw blurRad="76200" dist="25400" dir="8100000" algn="bl" rotWithShape="0">
+            <a:outerShdw sx="100000" sy="100000" kx="0" ky="0" algn="bl" rotWithShape="0" blurRad="76200" dist="25400" dir="8100000">
               <a:srgbClr val="000000">
                 <a:alpha val="12000"/>
               </a:srgbClr>
             </a:outerShdw>
           </a:effectLst>
         </p:spPr>
-        <p:txBody>
-          <a:bodyPr/>
-          <a:lstStyle/>
-          <a:p>
-            <a:endParaRPr lang="en-US"/>
-          </a:p>
-        </p:txBody>
       </p:sp>
       <p:sp>
         <p:nvSpPr>
@@ -7279,13 +7117,6 @@
           </a:solidFill>
           <a:ln/>
         </p:spPr>
-        <p:txBody>
-          <a:bodyPr/>
-          <a:lstStyle/>
-          <a:p>
-            <a:endParaRPr lang="en-US"/>
-          </a:p>
-        </p:txBody>
       </p:sp>
       <p:sp>
         <p:nvSpPr>
@@ -7308,7 +7139,7 @@
           <a:bodyPr wrap="square" lIns="0" tIns="0" rIns="0" bIns="0" rtlCol="0" anchor="ctr"/>
           <a:lstStyle/>
           <a:p>
-            <a:pPr marL="0" indent="0">
+            <a:pPr indent="0" marL="0">
               <a:buNone/>
             </a:pPr>
             <a:r>
@@ -7347,7 +7178,7 @@
           <a:bodyPr wrap="square" lIns="0" tIns="0" rIns="0" bIns="0" rtlCol="0" anchor="ctr"/>
           <a:lstStyle/>
           <a:p>
-            <a:pPr marL="0" indent="0">
+            <a:pPr indent="0" marL="0">
               <a:buNone/>
             </a:pPr>
             <a:r>
@@ -7384,20 +7215,13 @@
           </a:solidFill>
           <a:ln/>
           <a:effectLst>
-            <a:outerShdw blurRad="76200" dist="25400" dir="8100000" algn="bl" rotWithShape="0">
+            <a:outerShdw sx="100000" sy="100000" kx="0" ky="0" algn="bl" rotWithShape="0" blurRad="76200" dist="25400" dir="8100000">
               <a:srgbClr val="000000">
                 <a:alpha val="12000"/>
               </a:srgbClr>
             </a:outerShdw>
           </a:effectLst>
         </p:spPr>
-        <p:txBody>
-          <a:bodyPr/>
-          <a:lstStyle/>
-          <a:p>
-            <a:endParaRPr lang="en-US"/>
-          </a:p>
-        </p:txBody>
       </p:sp>
       <p:sp>
         <p:nvSpPr>
@@ -7418,13 +7242,6 @@
           </a:solidFill>
           <a:ln/>
         </p:spPr>
-        <p:txBody>
-          <a:bodyPr/>
-          <a:lstStyle/>
-          <a:p>
-            <a:endParaRPr lang="en-US"/>
-          </a:p>
-        </p:txBody>
       </p:sp>
       <p:sp>
         <p:nvSpPr>
@@ -7447,7 +7264,7 @@
           <a:bodyPr wrap="square" lIns="0" tIns="0" rIns="0" bIns="0" rtlCol="0" anchor="ctr"/>
           <a:lstStyle/>
           <a:p>
-            <a:pPr marL="0" indent="0">
+            <a:pPr indent="0" marL="0">
               <a:buNone/>
             </a:pPr>
             <a:r>
@@ -7486,7 +7303,7 @@
           <a:bodyPr wrap="square" lIns="0" tIns="0" rIns="0" bIns="0" rtlCol="0" anchor="ctr"/>
           <a:lstStyle/>
           <a:p>
-            <a:pPr marL="0" indent="0">
+            <a:pPr indent="0" marL="0">
               <a:buNone/>
             </a:pPr>
             <a:r>
@@ -7523,20 +7340,13 @@
           </a:solidFill>
           <a:ln/>
           <a:effectLst>
-            <a:outerShdw blurRad="76200" dist="25400" dir="8100000" algn="bl" rotWithShape="0">
+            <a:outerShdw sx="100000" sy="100000" kx="0" ky="0" algn="bl" rotWithShape="0" blurRad="76200" dist="25400" dir="8100000">
               <a:srgbClr val="000000">
                 <a:alpha val="12000"/>
               </a:srgbClr>
             </a:outerShdw>
           </a:effectLst>
         </p:spPr>
-        <p:txBody>
-          <a:bodyPr/>
-          <a:lstStyle/>
-          <a:p>
-            <a:endParaRPr lang="en-US"/>
-          </a:p>
-        </p:txBody>
       </p:sp>
       <p:sp>
         <p:nvSpPr>
@@ -7557,13 +7367,6 @@
           </a:solidFill>
           <a:ln/>
         </p:spPr>
-        <p:txBody>
-          <a:bodyPr/>
-          <a:lstStyle/>
-          <a:p>
-            <a:endParaRPr lang="en-US"/>
-          </a:p>
-        </p:txBody>
       </p:sp>
       <p:sp>
         <p:nvSpPr>
@@ -7586,7 +7389,7 @@
           <a:bodyPr wrap="square" lIns="0" tIns="0" rIns="0" bIns="0" rtlCol="0" anchor="ctr"/>
           <a:lstStyle/>
           <a:p>
-            <a:pPr marL="0" indent="0">
+            <a:pPr indent="0" marL="0">
               <a:buNone/>
             </a:pPr>
             <a:r>
@@ -7625,7 +7428,7 @@
           <a:bodyPr wrap="square" lIns="0" tIns="0" rIns="0" bIns="0" rtlCol="0" anchor="ctr"/>
           <a:lstStyle/>
           <a:p>
-            <a:pPr marL="0" indent="0">
+            <a:pPr indent="0" marL="0">
               <a:buNone/>
             </a:pPr>
             <a:r>
@@ -7664,7 +7467,7 @@
           <a:bodyPr wrap="square" rtlCol="0" anchor="ctr"/>
           <a:lstStyle/>
           <a:p>
-            <a:pPr marL="0" indent="0" algn="r">
+            <a:pPr algn="r" indent="0" marL="0">
               <a:buNone/>
             </a:pPr>
             <a:r>
@@ -7698,7 +7501,6 @@
         <a:solidFill>
           <a:srgbClr val="FAFAFA"/>
         </a:solidFill>
-        <a:effectLst/>
       </p:bgPr>
     </p:bg>
     <p:spTree>
@@ -7734,13 +7536,6 @@
           </a:solidFill>
           <a:ln/>
         </p:spPr>
-        <p:txBody>
-          <a:bodyPr/>
-          <a:lstStyle/>
-          <a:p>
-            <a:endParaRPr lang="en-US"/>
-          </a:p>
-        </p:txBody>
       </p:sp>
       <p:sp>
         <p:nvSpPr>
@@ -7763,7 +7558,7 @@
           <a:bodyPr wrap="square" lIns="0" tIns="0" rIns="0" bIns="0" rtlCol="0" anchor="ctr"/>
           <a:lstStyle/>
           <a:p>
-            <a:pPr marL="0" indent="0">
+            <a:pPr indent="0" marL="0">
               <a:buNone/>
             </a:pPr>
             <a:r>
@@ -7800,20 +7595,13 @@
           </a:solidFill>
           <a:ln/>
           <a:effectLst>
-            <a:outerShdw blurRad="76200" dist="25400" dir="8100000" algn="bl" rotWithShape="0">
+            <a:outerShdw sx="100000" sy="100000" kx="0" ky="0" algn="bl" rotWithShape="0" blurRad="76200" dist="25400" dir="8100000">
               <a:srgbClr val="000000">
                 <a:alpha val="12000"/>
               </a:srgbClr>
             </a:outerShdw>
           </a:effectLst>
         </p:spPr>
-        <p:txBody>
-          <a:bodyPr/>
-          <a:lstStyle/>
-          <a:p>
-            <a:endParaRPr lang="en-US"/>
-          </a:p>
-        </p:txBody>
       </p:sp>
       <p:sp>
         <p:nvSpPr>
@@ -7836,7 +7624,7 @@
           <a:bodyPr wrap="square" lIns="0" tIns="0" rIns="0" bIns="0" rtlCol="0" anchor="ctr"/>
           <a:lstStyle/>
           <a:p>
-            <a:pPr marL="0" indent="0">
+            <a:pPr indent="0" marL="0">
               <a:buNone/>
             </a:pPr>
             <a:r>
@@ -7875,7 +7663,7 @@
           <a:bodyPr wrap="square" lIns="0" tIns="0" rIns="0" bIns="0" rtlCol="0" anchor="ctr"/>
           <a:lstStyle/>
           <a:p>
-            <a:pPr marL="0" indent="0">
+            <a:pPr indent="0" marL="0">
               <a:buNone/>
             </a:pPr>
             <a:r>
@@ -7912,20 +7700,13 @@
           </a:solidFill>
           <a:ln/>
           <a:effectLst>
-            <a:outerShdw blurRad="76200" dist="25400" dir="8100000" algn="bl" rotWithShape="0">
+            <a:outerShdw sx="100000" sy="100000" kx="0" ky="0" algn="bl" rotWithShape="0" blurRad="76200" dist="25400" dir="8100000">
               <a:srgbClr val="000000">
                 <a:alpha val="12000"/>
               </a:srgbClr>
             </a:outerShdw>
           </a:effectLst>
         </p:spPr>
-        <p:txBody>
-          <a:bodyPr/>
-          <a:lstStyle/>
-          <a:p>
-            <a:endParaRPr lang="en-US"/>
-          </a:p>
-        </p:txBody>
       </p:sp>
       <p:sp>
         <p:nvSpPr>
@@ -7948,7 +7729,7 @@
           <a:bodyPr wrap="square" lIns="0" tIns="0" rIns="0" bIns="0" rtlCol="0" anchor="ctr"/>
           <a:lstStyle/>
           <a:p>
-            <a:pPr marL="0" indent="0">
+            <a:pPr indent="0" marL="0">
               <a:buNone/>
             </a:pPr>
             <a:r>
@@ -7987,7 +7768,7 @@
           <a:bodyPr wrap="square" lIns="0" tIns="0" rIns="0" bIns="0" rtlCol="0" anchor="ctr"/>
           <a:lstStyle/>
           <a:p>
-            <a:pPr marL="0" indent="0">
+            <a:pPr indent="0" marL="0">
               <a:buNone/>
             </a:pPr>
             <a:r>
@@ -8024,20 +7805,13 @@
           </a:solidFill>
           <a:ln/>
           <a:effectLst>
-            <a:outerShdw blurRad="76200" dist="25400" dir="8100000" algn="bl" rotWithShape="0">
+            <a:outerShdw sx="100000" sy="100000" kx="0" ky="0" algn="bl" rotWithShape="0" blurRad="76200" dist="25400" dir="8100000">
               <a:srgbClr val="000000">
                 <a:alpha val="12000"/>
               </a:srgbClr>
             </a:outerShdw>
           </a:effectLst>
         </p:spPr>
-        <p:txBody>
-          <a:bodyPr/>
-          <a:lstStyle/>
-          <a:p>
-            <a:endParaRPr lang="en-US"/>
-          </a:p>
-        </p:txBody>
       </p:sp>
       <p:sp>
         <p:nvSpPr>
@@ -8060,7 +7834,7 @@
           <a:bodyPr wrap="square" lIns="0" tIns="0" rIns="0" bIns="0" rtlCol="0" anchor="ctr"/>
           <a:lstStyle/>
           <a:p>
-            <a:pPr marL="0" indent="0">
+            <a:pPr indent="0" marL="0">
               <a:buNone/>
             </a:pPr>
             <a:r>
@@ -8099,7 +7873,7 @@
           <a:bodyPr wrap="square" lIns="0" tIns="0" rIns="0" bIns="0" rtlCol="0" anchor="ctr"/>
           <a:lstStyle/>
           <a:p>
-            <a:pPr marL="0" indent="0">
+            <a:pPr indent="0" marL="0">
               <a:buNone/>
             </a:pPr>
             <a:r>
@@ -8139,13 +7913,6 @@
             <a:prstDash val="solid"/>
           </a:ln>
         </p:spPr>
-        <p:txBody>
-          <a:bodyPr/>
-          <a:lstStyle/>
-          <a:p>
-            <a:endParaRPr lang="en-US"/>
-          </a:p>
-        </p:txBody>
       </p:sp>
       <p:sp>
         <p:nvSpPr>
@@ -8169,13 +7936,6 @@
             <a:prstDash val="solid"/>
           </a:ln>
         </p:spPr>
-        <p:txBody>
-          <a:bodyPr/>
-          <a:lstStyle/>
-          <a:p>
-            <a:endParaRPr lang="en-US"/>
-          </a:p>
-        </p:txBody>
       </p:sp>
       <p:sp>
         <p:nvSpPr>
@@ -8198,7 +7958,7 @@
           <a:bodyPr wrap="square" rtlCol="0" anchor="ctr"/>
           <a:lstStyle/>
           <a:p>
-            <a:pPr marL="0" indent="0" algn="r">
+            <a:pPr algn="r" indent="0" marL="0">
               <a:buNone/>
             </a:pPr>
             <a:r>
@@ -8232,7 +7992,6 @@
         <a:solidFill>
           <a:srgbClr val="FAFAFA"/>
         </a:solidFill>
-        <a:effectLst/>
       </p:bgPr>
     </p:bg>
     <p:spTree>
@@ -8268,13 +8027,6 @@
           </a:solidFill>
           <a:ln/>
         </p:spPr>
-        <p:txBody>
-          <a:bodyPr/>
-          <a:lstStyle/>
-          <a:p>
-            <a:endParaRPr lang="en-US"/>
-          </a:p>
-        </p:txBody>
       </p:sp>
       <p:sp>
         <p:nvSpPr>
@@ -8297,7 +8049,7 @@
           <a:bodyPr wrap="square" lIns="0" tIns="0" rIns="0" bIns="0" rtlCol="0" anchor="ctr"/>
           <a:lstStyle/>
           <a:p>
-            <a:pPr marL="0" indent="0">
+            <a:pPr indent="0" marL="0">
               <a:buNone/>
             </a:pPr>
             <a:r>
@@ -8336,7 +8088,7 @@
           <a:bodyPr wrap="square" lIns="0" tIns="0" rIns="0" bIns="0" rtlCol="0" anchor="ctr"/>
           <a:lstStyle/>
           <a:p>
-            <a:pPr marL="0" indent="0">
+            <a:pPr indent="0" marL="0">
               <a:buNone/>
             </a:pPr>
             <a:r>
@@ -8373,13 +8125,6 @@
           </a:solidFill>
           <a:ln/>
         </p:spPr>
-        <p:txBody>
-          <a:bodyPr/>
-          <a:lstStyle/>
-          <a:p>
-            <a:endParaRPr lang="en-US"/>
-          </a:p>
-        </p:txBody>
       </p:sp>
       <p:sp>
         <p:nvSpPr>
@@ -8402,7 +8147,7 @@
           <a:bodyPr wrap="square" lIns="0" tIns="0" rIns="0" bIns="0" rtlCol="0" anchor="ctr"/>
           <a:lstStyle/>
           <a:p>
-            <a:pPr marL="0" indent="0">
+            <a:pPr indent="0" marL="0">
               <a:buNone/>
             </a:pPr>
             <a:r>
@@ -8441,7 +8186,7 @@
           <a:bodyPr wrap="square" lIns="0" tIns="0" rIns="0" bIns="0" rtlCol="0" anchor="ctr"/>
           <a:lstStyle/>
           <a:p>
-            <a:pPr marL="0" indent="0">
+            <a:pPr indent="0" marL="0">
               <a:buNone/>
             </a:pPr>
             <a:r>
@@ -8478,13 +8223,6 @@
           </a:solidFill>
           <a:ln/>
         </p:spPr>
-        <p:txBody>
-          <a:bodyPr/>
-          <a:lstStyle/>
-          <a:p>
-            <a:endParaRPr lang="en-US"/>
-          </a:p>
-        </p:txBody>
       </p:sp>
       <p:sp>
         <p:nvSpPr>
@@ -8507,7 +8245,7 @@
           <a:bodyPr wrap="square" lIns="0" tIns="0" rIns="0" bIns="0" rtlCol="0" anchor="ctr"/>
           <a:lstStyle/>
           <a:p>
-            <a:pPr marL="0" indent="0">
+            <a:pPr indent="0" marL="0">
               <a:buNone/>
             </a:pPr>
             <a:r>
@@ -8546,7 +8284,7 @@
           <a:bodyPr wrap="square" lIns="0" tIns="0" rIns="0" bIns="0" rtlCol="0" anchor="ctr"/>
           <a:lstStyle/>
           <a:p>
-            <a:pPr marL="0" indent="0">
+            <a:pPr indent="0" marL="0">
               <a:buNone/>
             </a:pPr>
             <a:r>
@@ -8583,13 +8321,6 @@
           </a:solidFill>
           <a:ln/>
         </p:spPr>
-        <p:txBody>
-          <a:bodyPr/>
-          <a:lstStyle/>
-          <a:p>
-            <a:endParaRPr lang="en-US"/>
-          </a:p>
-        </p:txBody>
       </p:sp>
       <p:sp>
         <p:nvSpPr>
@@ -8612,7 +8343,7 @@
           <a:bodyPr wrap="square" lIns="0" tIns="0" rIns="0" bIns="0" rtlCol="0" anchor="ctr"/>
           <a:lstStyle/>
           <a:p>
-            <a:pPr marL="0" indent="0">
+            <a:pPr indent="0" marL="0">
               <a:buNone/>
             </a:pPr>
             <a:r>
@@ -8651,7 +8382,7 @@
           <a:bodyPr wrap="square" lIns="0" tIns="0" rIns="0" bIns="0" rtlCol="0" anchor="ctr"/>
           <a:lstStyle/>
           <a:p>
-            <a:pPr marL="0" indent="0">
+            <a:pPr indent="0" marL="0">
               <a:buNone/>
             </a:pPr>
             <a:r>
@@ -8688,13 +8419,6 @@
           </a:solidFill>
           <a:ln/>
         </p:spPr>
-        <p:txBody>
-          <a:bodyPr/>
-          <a:lstStyle/>
-          <a:p>
-            <a:endParaRPr lang="en-US"/>
-          </a:p>
-        </p:txBody>
       </p:sp>
       <p:sp>
         <p:nvSpPr>
@@ -8717,7 +8441,7 @@
           <a:bodyPr wrap="square" lIns="0" tIns="0" rIns="0" bIns="0" rtlCol="0" anchor="ctr"/>
           <a:lstStyle/>
           <a:p>
-            <a:pPr marL="0" indent="0">
+            <a:pPr indent="0" marL="0">
               <a:buNone/>
             </a:pPr>
             <a:r>
@@ -8756,7 +8480,7 @@
           <a:bodyPr wrap="square" lIns="0" tIns="0" rIns="0" bIns="0" rtlCol="0" anchor="ctr"/>
           <a:lstStyle/>
           <a:p>
-            <a:pPr marL="0" indent="0">
+            <a:pPr indent="0" marL="0">
               <a:buNone/>
             </a:pPr>
             <a:r>
@@ -8793,13 +8517,6 @@
           </a:solidFill>
           <a:ln/>
         </p:spPr>
-        <p:txBody>
-          <a:bodyPr/>
-          <a:lstStyle/>
-          <a:p>
-            <a:endParaRPr lang="en-US"/>
-          </a:p>
-        </p:txBody>
       </p:sp>
       <p:sp>
         <p:nvSpPr>
@@ -8822,7 +8539,7 @@
           <a:bodyPr wrap="square" lIns="0" tIns="0" rIns="0" bIns="0" rtlCol="0" anchor="ctr"/>
           <a:lstStyle/>
           <a:p>
-            <a:pPr marL="0" indent="0">
+            <a:pPr indent="0" marL="0">
               <a:buNone/>
             </a:pPr>
             <a:r>
@@ -8861,7 +8578,7 @@
           <a:bodyPr wrap="square" lIns="0" tIns="0" rIns="0" bIns="0" rtlCol="0" anchor="ctr"/>
           <a:lstStyle/>
           <a:p>
-            <a:pPr marL="0" indent="0">
+            <a:pPr indent="0" marL="0">
               <a:buNone/>
             </a:pPr>
             <a:r>
@@ -8900,7 +8617,7 @@
           <a:bodyPr wrap="square" rtlCol="0" anchor="ctr"/>
           <a:lstStyle/>
           <a:p>
-            <a:pPr marL="0" indent="0" algn="r">
+            <a:pPr algn="r" indent="0" marL="0">
               <a:buNone/>
             </a:pPr>
             <a:r>
@@ -8934,7 +8651,6 @@
         <a:solidFill>
           <a:srgbClr val="1B5E20"/>
         </a:solidFill>
-        <a:effectLst/>
       </p:bgPr>
     </p:bg>
     <p:spTree>
@@ -8970,13 +8686,6 @@
           </a:solidFill>
           <a:ln/>
         </p:spPr>
-        <p:txBody>
-          <a:bodyPr/>
-          <a:lstStyle/>
-          <a:p>
-            <a:endParaRPr lang="en-US"/>
-          </a:p>
-        </p:txBody>
       </p:sp>
       <p:sp>
         <p:nvSpPr>
@@ -8999,7 +8708,7 @@
           <a:bodyPr wrap="square" lIns="0" tIns="0" rIns="0" bIns="0" rtlCol="0" anchor="ctr"/>
           <a:lstStyle/>
           <a:p>
-            <a:pPr marL="0" indent="0">
+            <a:pPr indent="0" marL="0">
               <a:buNone/>
             </a:pPr>
             <a:r>
@@ -9038,7 +8747,7 @@
           <a:bodyPr wrap="square" lIns="0" tIns="0" rIns="0" bIns="0" rtlCol="0" anchor="ctr"/>
           <a:lstStyle/>
           <a:p>
-            <a:pPr marL="0" indent="0">
+            <a:pPr indent="0" marL="0">
               <a:buNone/>
             </a:pPr>
             <a:r>
@@ -9075,20 +8784,13 @@
           </a:solidFill>
           <a:ln/>
           <a:effectLst>
-            <a:outerShdw blurRad="76200" dist="25400" dir="8100000" algn="bl" rotWithShape="0">
+            <a:outerShdw sx="100000" sy="100000" kx="0" ky="0" algn="bl" rotWithShape="0" blurRad="76200" dist="25400" dir="8100000">
               <a:srgbClr val="000000">
                 <a:alpha val="12000"/>
               </a:srgbClr>
             </a:outerShdw>
           </a:effectLst>
         </p:spPr>
-        <p:txBody>
-          <a:bodyPr/>
-          <a:lstStyle/>
-          <a:p>
-            <a:endParaRPr lang="en-US"/>
-          </a:p>
-        </p:txBody>
       </p:sp>
       <p:sp>
         <p:nvSpPr>
@@ -9111,7 +8813,7 @@
           <a:bodyPr wrap="square" lIns="0" tIns="0" rIns="0" bIns="0" rtlCol="0" anchor="ctr"/>
           <a:lstStyle/>
           <a:p>
-            <a:pPr marL="0" indent="0" algn="ctr">
+            <a:pPr algn="ctr" indent="0" marL="0">
               <a:buNone/>
             </a:pPr>
             <a:r>
@@ -9151,13 +8853,6 @@
             <a:prstDash val="solid"/>
           </a:ln>
         </p:spPr>
-        <p:txBody>
-          <a:bodyPr/>
-          <a:lstStyle/>
-          <a:p>
-            <a:endParaRPr lang="en-US"/>
-          </a:p>
-        </p:txBody>
       </p:sp>
       <p:sp>
         <p:nvSpPr>
@@ -9178,20 +8873,13 @@
           </a:solidFill>
           <a:ln/>
           <a:effectLst>
-            <a:outerShdw blurRad="76200" dist="25400" dir="8100000" algn="bl" rotWithShape="0">
+            <a:outerShdw sx="100000" sy="100000" kx="0" ky="0" algn="bl" rotWithShape="0" blurRad="76200" dist="25400" dir="8100000">
               <a:srgbClr val="000000">
                 <a:alpha val="12000"/>
               </a:srgbClr>
             </a:outerShdw>
           </a:effectLst>
         </p:spPr>
-        <p:txBody>
-          <a:bodyPr/>
-          <a:lstStyle/>
-          <a:p>
-            <a:endParaRPr lang="en-US"/>
-          </a:p>
-        </p:txBody>
       </p:sp>
       <p:sp>
         <p:nvSpPr>
@@ -9214,7 +8902,7 @@
           <a:bodyPr wrap="square" lIns="0" tIns="0" rIns="0" bIns="0" rtlCol="0" anchor="ctr"/>
           <a:lstStyle/>
           <a:p>
-            <a:pPr marL="0" indent="0" algn="ctr">
+            <a:pPr algn="ctr" indent="0" marL="0">
               <a:buNone/>
             </a:pPr>
             <a:r>
@@ -9254,13 +8942,6 @@
             <a:prstDash val="solid"/>
           </a:ln>
         </p:spPr>
-        <p:txBody>
-          <a:bodyPr/>
-          <a:lstStyle/>
-          <a:p>
-            <a:endParaRPr lang="en-US"/>
-          </a:p>
-        </p:txBody>
       </p:sp>
       <p:sp>
         <p:nvSpPr>
@@ -9281,20 +8962,13 @@
           </a:solidFill>
           <a:ln/>
           <a:effectLst>
-            <a:outerShdw blurRad="76200" dist="25400" dir="8100000" algn="bl" rotWithShape="0">
+            <a:outerShdw sx="100000" sy="100000" kx="0" ky="0" algn="bl" rotWithShape="0" blurRad="76200" dist="25400" dir="8100000">
               <a:srgbClr val="000000">
                 <a:alpha val="12000"/>
               </a:srgbClr>
             </a:outerShdw>
           </a:effectLst>
         </p:spPr>
-        <p:txBody>
-          <a:bodyPr/>
-          <a:lstStyle/>
-          <a:p>
-            <a:endParaRPr lang="en-US"/>
-          </a:p>
-        </p:txBody>
       </p:sp>
       <p:sp>
         <p:nvSpPr>
@@ -9317,7 +8991,7 @@
           <a:bodyPr wrap="square" lIns="0" tIns="0" rIns="0" bIns="0" rtlCol="0" anchor="ctr"/>
           <a:lstStyle/>
           <a:p>
-            <a:pPr marL="0" indent="0" algn="ctr">
+            <a:pPr algn="ctr" indent="0" marL="0">
               <a:buNone/>
             </a:pPr>
             <a:r>
@@ -9357,13 +9031,6 @@
             <a:prstDash val="solid"/>
           </a:ln>
         </p:spPr>
-        <p:txBody>
-          <a:bodyPr/>
-          <a:lstStyle/>
-          <a:p>
-            <a:endParaRPr lang="en-US"/>
-          </a:p>
-        </p:txBody>
       </p:sp>
       <p:sp>
         <p:nvSpPr>
@@ -9384,20 +9051,13 @@
           </a:solidFill>
           <a:ln/>
           <a:effectLst>
-            <a:outerShdw blurRad="76200" dist="25400" dir="8100000" algn="bl" rotWithShape="0">
+            <a:outerShdw sx="100000" sy="100000" kx="0" ky="0" algn="bl" rotWithShape="0" blurRad="76200" dist="25400" dir="8100000">
               <a:srgbClr val="000000">
                 <a:alpha val="12000"/>
               </a:srgbClr>
             </a:outerShdw>
           </a:effectLst>
         </p:spPr>
-        <p:txBody>
-          <a:bodyPr/>
-          <a:lstStyle/>
-          <a:p>
-            <a:endParaRPr lang="en-US"/>
-          </a:p>
-        </p:txBody>
       </p:sp>
       <p:sp>
         <p:nvSpPr>
@@ -9420,7 +9080,7 @@
           <a:bodyPr wrap="square" lIns="0" tIns="0" rIns="0" bIns="0" rtlCol="0" anchor="ctr"/>
           <a:lstStyle/>
           <a:p>
-            <a:pPr marL="0" indent="0" algn="ctr">
+            <a:pPr algn="ctr" indent="0" marL="0">
               <a:buNone/>
             </a:pPr>
             <a:r>
@@ -9459,7 +9119,7 @@
           <a:bodyPr wrap="square" lIns="0" tIns="0" rIns="0" bIns="0" rtlCol="0" anchor="ctr"/>
           <a:lstStyle/>
           <a:p>
-            <a:pPr marL="0" indent="0">
+            <a:pPr indent="0" marL="0">
               <a:buNone/>
             </a:pPr>
             <a:r>
@@ -9498,7 +9158,7 @@
           <a:bodyPr wrap="square" lIns="0" tIns="0" rIns="0" bIns="0" rtlCol="0" anchor="ctr"/>
           <a:lstStyle/>
           <a:p>
-            <a:pPr marL="0" indent="0">
+            <a:pPr indent="0" marL="0">
               <a:buNone/>
             </a:pPr>
             <a:r>
@@ -9537,7 +9197,7 @@
           <a:bodyPr wrap="square" lIns="0" tIns="0" rIns="0" bIns="0" rtlCol="0" anchor="ctr"/>
           <a:lstStyle/>
           <a:p>
-            <a:pPr marL="0" indent="0">
+            <a:pPr indent="0" marL="0">
               <a:buNone/>
             </a:pPr>
             <a:r>
@@ -9576,7 +9236,7 @@
           <a:bodyPr wrap="square" lIns="0" tIns="0" rIns="0" bIns="0" rtlCol="0" anchor="ctr"/>
           <a:lstStyle/>
           <a:p>
-            <a:pPr marL="0" indent="0">
+            <a:pPr indent="0" marL="0">
               <a:buNone/>
             </a:pPr>
             <a:r>
@@ -9615,7 +9275,7 @@
           <a:bodyPr wrap="square" lIns="0" tIns="0" rIns="0" bIns="0" rtlCol="0" anchor="ctr"/>
           <a:lstStyle/>
           <a:p>
-            <a:pPr marL="0" indent="0">
+            <a:pPr indent="0" marL="0">
               <a:buNone/>
             </a:pPr>
             <a:r>
@@ -9654,7 +9314,7 @@
           <a:bodyPr wrap="square" rtlCol="0" anchor="ctr"/>
           <a:lstStyle/>
           <a:p>
-            <a:pPr marL="0" indent="0" algn="r">
+            <a:pPr algn="r" indent="0" marL="0">
               <a:buNone/>
             </a:pPr>
             <a:r>
@@ -9688,7 +9348,6 @@
         <a:solidFill>
           <a:srgbClr val="FAFAFA"/>
         </a:solidFill>
-        <a:effectLst/>
       </p:bgPr>
     </p:bg>
     <p:spTree>
@@ -9724,13 +9383,6 @@
           </a:solidFill>
           <a:ln/>
         </p:spPr>
-        <p:txBody>
-          <a:bodyPr/>
-          <a:lstStyle/>
-          <a:p>
-            <a:endParaRPr lang="en-US"/>
-          </a:p>
-        </p:txBody>
       </p:sp>
       <p:sp>
         <p:nvSpPr>
@@ -9753,7 +9405,7 @@
           <a:bodyPr wrap="square" lIns="0" tIns="0" rIns="0" bIns="0" rtlCol="0" anchor="ctr"/>
           <a:lstStyle/>
           <a:p>
-            <a:pPr marL="0" indent="0">
+            <a:pPr indent="0" marL="0">
               <a:buNone/>
             </a:pPr>
             <a:r>
@@ -9790,20 +9442,13 @@
           </a:solidFill>
           <a:ln/>
           <a:effectLst>
-            <a:outerShdw blurRad="50800" dist="12700" dir="8100000" algn="bl" rotWithShape="0">
+            <a:outerShdw sx="100000" sy="100000" kx="0" ky="0" algn="bl" rotWithShape="0" blurRad="50800" dist="12700" dir="8100000">
               <a:srgbClr val="000000">
                 <a:alpha val="8000"/>
               </a:srgbClr>
             </a:outerShdw>
           </a:effectLst>
         </p:spPr>
-        <p:txBody>
-          <a:bodyPr/>
-          <a:lstStyle/>
-          <a:p>
-            <a:endParaRPr lang="en-US"/>
-          </a:p>
-        </p:txBody>
       </p:sp>
       <p:sp>
         <p:nvSpPr>
@@ -9824,13 +9469,6 @@
           </a:solidFill>
           <a:ln/>
         </p:spPr>
-        <p:txBody>
-          <a:bodyPr/>
-          <a:lstStyle/>
-          <a:p>
-            <a:endParaRPr lang="en-US"/>
-          </a:p>
-        </p:txBody>
       </p:sp>
       <p:sp>
         <p:nvSpPr>
@@ -9853,7 +9491,7 @@
           <a:bodyPr wrap="square" lIns="0" tIns="0" rIns="0" bIns="0" rtlCol="0" anchor="ctr"/>
           <a:lstStyle/>
           <a:p>
-            <a:pPr marL="0" indent="0">
+            <a:pPr indent="0" marL="0">
               <a:buNone/>
             </a:pPr>
             <a:r>
@@ -9892,7 +9530,7 @@
           <a:bodyPr wrap="square" lIns="0" tIns="0" rIns="0" bIns="0" rtlCol="0" anchor="ctr"/>
           <a:lstStyle/>
           <a:p>
-            <a:pPr marL="0" indent="0">
+            <a:pPr indent="0" marL="0">
               <a:buNone/>
             </a:pPr>
             <a:r>
@@ -9929,20 +9567,13 @@
           </a:solidFill>
           <a:ln/>
           <a:effectLst>
-            <a:outerShdw blurRad="50800" dist="12700" dir="8100000" algn="bl" rotWithShape="0">
+            <a:outerShdw sx="100000" sy="100000" kx="0" ky="0" algn="bl" rotWithShape="0" blurRad="50800" dist="12700" dir="8100000">
               <a:srgbClr val="000000">
                 <a:alpha val="8000"/>
               </a:srgbClr>
             </a:outerShdw>
           </a:effectLst>
         </p:spPr>
-        <p:txBody>
-          <a:bodyPr/>
-          <a:lstStyle/>
-          <a:p>
-            <a:endParaRPr lang="en-US"/>
-          </a:p>
-        </p:txBody>
       </p:sp>
       <p:sp>
         <p:nvSpPr>
@@ -9963,13 +9594,6 @@
           </a:solidFill>
           <a:ln/>
         </p:spPr>
-        <p:txBody>
-          <a:bodyPr/>
-          <a:lstStyle/>
-          <a:p>
-            <a:endParaRPr lang="en-US"/>
-          </a:p>
-        </p:txBody>
       </p:sp>
       <p:sp>
         <p:nvSpPr>
@@ -9992,7 +9616,7 @@
           <a:bodyPr wrap="square" lIns="0" tIns="0" rIns="0" bIns="0" rtlCol="0" anchor="ctr"/>
           <a:lstStyle/>
           <a:p>
-            <a:pPr marL="0" indent="0">
+            <a:pPr indent="0" marL="0">
               <a:buNone/>
             </a:pPr>
             <a:r>
@@ -10031,7 +9655,7 @@
           <a:bodyPr wrap="square" lIns="0" tIns="0" rIns="0" bIns="0" rtlCol="0" anchor="ctr"/>
           <a:lstStyle/>
           <a:p>
-            <a:pPr marL="0" indent="0">
+            <a:pPr indent="0" marL="0">
               <a:buNone/>
             </a:pPr>
             <a:r>
@@ -10068,20 +9692,13 @@
           </a:solidFill>
           <a:ln/>
           <a:effectLst>
-            <a:outerShdw blurRad="50800" dist="12700" dir="8100000" algn="bl" rotWithShape="0">
+            <a:outerShdw sx="100000" sy="100000" kx="0" ky="0" algn="bl" rotWithShape="0" blurRad="50800" dist="12700" dir="8100000">
               <a:srgbClr val="000000">
                 <a:alpha val="8000"/>
               </a:srgbClr>
             </a:outerShdw>
           </a:effectLst>
         </p:spPr>
-        <p:txBody>
-          <a:bodyPr/>
-          <a:lstStyle/>
-          <a:p>
-            <a:endParaRPr lang="en-US"/>
-          </a:p>
-        </p:txBody>
       </p:sp>
       <p:sp>
         <p:nvSpPr>
@@ -10102,13 +9719,6 @@
           </a:solidFill>
           <a:ln/>
         </p:spPr>
-        <p:txBody>
-          <a:bodyPr/>
-          <a:lstStyle/>
-          <a:p>
-            <a:endParaRPr lang="en-US"/>
-          </a:p>
-        </p:txBody>
       </p:sp>
       <p:sp>
         <p:nvSpPr>
@@ -10131,7 +9741,7 @@
           <a:bodyPr wrap="square" lIns="0" tIns="0" rIns="0" bIns="0" rtlCol="0" anchor="ctr"/>
           <a:lstStyle/>
           <a:p>
-            <a:pPr marL="0" indent="0">
+            <a:pPr indent="0" marL="0">
               <a:buNone/>
             </a:pPr>
             <a:r>
@@ -10170,7 +9780,7 @@
           <a:bodyPr wrap="square" lIns="0" tIns="0" rIns="0" bIns="0" rtlCol="0" anchor="ctr"/>
           <a:lstStyle/>
           <a:p>
-            <a:pPr marL="0" indent="0">
+            <a:pPr indent="0" marL="0">
               <a:buNone/>
             </a:pPr>
             <a:r>
@@ -10207,20 +9817,13 @@
           </a:solidFill>
           <a:ln/>
           <a:effectLst>
-            <a:outerShdw blurRad="50800" dist="12700" dir="8100000" algn="bl" rotWithShape="0">
+            <a:outerShdw sx="100000" sy="100000" kx="0" ky="0" algn="bl" rotWithShape="0" blurRad="50800" dist="12700" dir="8100000">
               <a:srgbClr val="000000">
                 <a:alpha val="8000"/>
               </a:srgbClr>
             </a:outerShdw>
           </a:effectLst>
         </p:spPr>
-        <p:txBody>
-          <a:bodyPr/>
-          <a:lstStyle/>
-          <a:p>
-            <a:endParaRPr lang="en-US"/>
-          </a:p>
-        </p:txBody>
       </p:sp>
       <p:sp>
         <p:nvSpPr>
@@ -10241,13 +9844,6 @@
           </a:solidFill>
           <a:ln/>
         </p:spPr>
-        <p:txBody>
-          <a:bodyPr/>
-          <a:lstStyle/>
-          <a:p>
-            <a:endParaRPr lang="en-US"/>
-          </a:p>
-        </p:txBody>
       </p:sp>
       <p:sp>
         <p:nvSpPr>
@@ -10270,7 +9866,7 @@
           <a:bodyPr wrap="square" lIns="0" tIns="0" rIns="0" bIns="0" rtlCol="0" anchor="ctr"/>
           <a:lstStyle/>
           <a:p>
-            <a:pPr marL="0" indent="0">
+            <a:pPr indent="0" marL="0">
               <a:buNone/>
             </a:pPr>
             <a:r>
@@ -10309,7 +9905,7 @@
           <a:bodyPr wrap="square" lIns="0" tIns="0" rIns="0" bIns="0" rtlCol="0" anchor="ctr"/>
           <a:lstStyle/>
           <a:p>
-            <a:pPr marL="0" indent="0">
+            <a:pPr indent="0" marL="0">
               <a:buNone/>
             </a:pPr>
             <a:r>
@@ -10346,20 +9942,13 @@
           </a:solidFill>
           <a:ln/>
           <a:effectLst>
-            <a:outerShdw blurRad="50800" dist="12700" dir="8100000" algn="bl" rotWithShape="0">
+            <a:outerShdw sx="100000" sy="100000" kx="0" ky="0" algn="bl" rotWithShape="0" blurRad="50800" dist="12700" dir="8100000">
               <a:srgbClr val="000000">
                 <a:alpha val="8000"/>
               </a:srgbClr>
             </a:outerShdw>
           </a:effectLst>
         </p:spPr>
-        <p:txBody>
-          <a:bodyPr/>
-          <a:lstStyle/>
-          <a:p>
-            <a:endParaRPr lang="en-US"/>
-          </a:p>
-        </p:txBody>
       </p:sp>
       <p:sp>
         <p:nvSpPr>
@@ -10380,13 +9969,6 @@
           </a:solidFill>
           <a:ln/>
         </p:spPr>
-        <p:txBody>
-          <a:bodyPr/>
-          <a:lstStyle/>
-          <a:p>
-            <a:endParaRPr lang="en-US"/>
-          </a:p>
-        </p:txBody>
       </p:sp>
       <p:sp>
         <p:nvSpPr>
@@ -10409,7 +9991,7 @@
           <a:bodyPr wrap="square" lIns="0" tIns="0" rIns="0" bIns="0" rtlCol="0" anchor="ctr"/>
           <a:lstStyle/>
           <a:p>
-            <a:pPr marL="0" indent="0">
+            <a:pPr indent="0" marL="0">
               <a:buNone/>
             </a:pPr>
             <a:r>
@@ -10448,7 +10030,7 @@
           <a:bodyPr wrap="square" lIns="0" tIns="0" rIns="0" bIns="0" rtlCol="0" anchor="ctr"/>
           <a:lstStyle/>
           <a:p>
-            <a:pPr marL="0" indent="0">
+            <a:pPr indent="0" marL="0">
               <a:buNone/>
             </a:pPr>
             <a:r>
@@ -10485,20 +10067,13 @@
           </a:solidFill>
           <a:ln/>
           <a:effectLst>
-            <a:outerShdw blurRad="50800" dist="12700" dir="8100000" algn="bl" rotWithShape="0">
+            <a:outerShdw sx="100000" sy="100000" kx="0" ky="0" algn="bl" rotWithShape="0" blurRad="50800" dist="12700" dir="8100000">
               <a:srgbClr val="000000">
                 <a:alpha val="8000"/>
               </a:srgbClr>
             </a:outerShdw>
           </a:effectLst>
         </p:spPr>
-        <p:txBody>
-          <a:bodyPr/>
-          <a:lstStyle/>
-          <a:p>
-            <a:endParaRPr lang="en-US"/>
-          </a:p>
-        </p:txBody>
       </p:sp>
       <p:sp>
         <p:nvSpPr>
@@ -10519,13 +10094,6 @@
           </a:solidFill>
           <a:ln/>
         </p:spPr>
-        <p:txBody>
-          <a:bodyPr/>
-          <a:lstStyle/>
-          <a:p>
-            <a:endParaRPr lang="en-US"/>
-          </a:p>
-        </p:txBody>
       </p:sp>
       <p:sp>
         <p:nvSpPr>
@@ -10548,7 +10116,7 @@
           <a:bodyPr wrap="square" lIns="0" tIns="0" rIns="0" bIns="0" rtlCol="0" anchor="ctr"/>
           <a:lstStyle/>
           <a:p>
-            <a:pPr marL="0" indent="0">
+            <a:pPr indent="0" marL="0">
               <a:buNone/>
             </a:pPr>
             <a:r>
@@ -10587,7 +10155,7 @@
           <a:bodyPr wrap="square" lIns="0" tIns="0" rIns="0" bIns="0" rtlCol="0" anchor="ctr"/>
           <a:lstStyle/>
           <a:p>
-            <a:pPr marL="0" indent="0">
+            <a:pPr indent="0" marL="0">
               <a:buNone/>
             </a:pPr>
             <a:r>
@@ -10626,7 +10194,7 @@
           <a:bodyPr wrap="square" rtlCol="0" anchor="ctr"/>
           <a:lstStyle/>
           <a:p>
-            <a:pPr marL="0" indent="0" algn="r">
+            <a:pPr algn="r" indent="0" marL="0">
               <a:buNone/>
             </a:pPr>
             <a:r>
@@ -10660,7 +10228,6 @@
         <a:solidFill>
           <a:srgbClr val="FAFAFA"/>
         </a:solidFill>
-        <a:effectLst/>
       </p:bgPr>
     </p:bg>
     <p:spTree>
@@ -10696,13 +10263,6 @@
           </a:solidFill>
           <a:ln/>
         </p:spPr>
-        <p:txBody>
-          <a:bodyPr/>
-          <a:lstStyle/>
-          <a:p>
-            <a:endParaRPr lang="en-US"/>
-          </a:p>
-        </p:txBody>
       </p:sp>
       <p:sp>
         <p:nvSpPr>
@@ -10725,7 +10285,7 @@
           <a:bodyPr wrap="square" lIns="0" tIns="0" rIns="0" bIns="0" rtlCol="0" anchor="ctr"/>
           <a:lstStyle/>
           <a:p>
-            <a:pPr marL="0" indent="0">
+            <a:pPr indent="0" marL="0">
               <a:buNone/>
             </a:pPr>
             <a:r>
@@ -10764,7 +10324,7 @@
           <a:bodyPr wrap="square" lIns="0" tIns="0" rIns="0" bIns="0" rtlCol="0" anchor="ctr"/>
           <a:lstStyle/>
           <a:p>
-            <a:pPr marL="0" indent="0">
+            <a:pPr indent="0" marL="0">
               <a:buNone/>
             </a:pPr>
             <a:r>
@@ -10805,34 +10365,10 @@
             <a:tbl>
               <a:tblPr/>
               <a:tblGrid>
-                <a:gridCol w="1828800">
-                  <a:extLst>
-                    <a:ext uri="{9D8B030D-6E8A-4147-A177-3AD203B41FA5}">
-                      <a16:colId xmlns:a16="http://schemas.microsoft.com/office/drawing/2014/main" val="20000"/>
-                    </a:ext>
-                  </a:extLst>
-                </a:gridCol>
-                <a:gridCol w="2560320">
-                  <a:extLst>
-                    <a:ext uri="{9D8B030D-6E8A-4147-A177-3AD203B41FA5}">
-                      <a16:colId xmlns:a16="http://schemas.microsoft.com/office/drawing/2014/main" val="20001"/>
-                    </a:ext>
-                  </a:extLst>
-                </a:gridCol>
-                <a:gridCol w="1645920">
-                  <a:extLst>
-                    <a:ext uri="{9D8B030D-6E8A-4147-A177-3AD203B41FA5}">
-                      <a16:colId xmlns:a16="http://schemas.microsoft.com/office/drawing/2014/main" val="20002"/>
-                    </a:ext>
-                  </a:extLst>
-                </a:gridCol>
-                <a:gridCol w="1645920">
-                  <a:extLst>
-                    <a:ext uri="{9D8B030D-6E8A-4147-A177-3AD203B41FA5}">
-                      <a16:colId xmlns:a16="http://schemas.microsoft.com/office/drawing/2014/main" val="20003"/>
-                    </a:ext>
-                  </a:extLst>
-                </a:gridCol>
+                <a:gridCol w="1828800"/>
+                <a:gridCol w="2560320"/>
+                <a:gridCol w="1645920"/>
+                <a:gridCol w="1645920"/>
               </a:tblGrid>
               <a:tr h="365760">
                 <a:tc>
@@ -10840,7 +10376,7 @@
                     <a:bodyPr/>
                     <a:lstStyle/>
                     <a:p>
-                      <a:pPr marL="0" indent="0">
+                      <a:pPr indent="0" marL="0">
                         <a:buNone/>
                       </a:pPr>
                       <a:r>
@@ -10861,7 +10397,7 @@
                       </a:endParaRPr>
                     </a:p>
                   </a:txBody>
-                  <a:tcPr>
+                  <a:tcPr marL="91440" marR="91440" marT="45720" marB="45720">
                     <a:lnL w="6350" cap="flat" cmpd="sng" algn="ctr">
                       <a:solidFill>
                         <a:srgbClr val="E0E0E0"/>
@@ -10908,7 +10444,7 @@
                     <a:bodyPr/>
                     <a:lstStyle/>
                     <a:p>
-                      <a:pPr marL="0" indent="0">
+                      <a:pPr indent="0" marL="0">
                         <a:buNone/>
                       </a:pPr>
                       <a:r>
@@ -10929,7 +10465,7 @@
                       </a:endParaRPr>
                     </a:p>
                   </a:txBody>
-                  <a:tcPr>
+                  <a:tcPr marL="91440" marR="91440" marT="45720" marB="45720">
                     <a:lnL w="6350" cap="flat" cmpd="sng" algn="ctr">
                       <a:solidFill>
                         <a:srgbClr val="E0E0E0"/>
@@ -10976,7 +10512,7 @@
                     <a:bodyPr/>
                     <a:lstStyle/>
                     <a:p>
-                      <a:pPr marL="0" indent="0">
+                      <a:pPr indent="0" marL="0">
                         <a:buNone/>
                       </a:pPr>
                       <a:r>
@@ -10997,7 +10533,7 @@
                       </a:endParaRPr>
                     </a:p>
                   </a:txBody>
-                  <a:tcPr>
+                  <a:tcPr marL="91440" marR="91440" marT="45720" marB="45720">
                     <a:lnL w="6350" cap="flat" cmpd="sng" algn="ctr">
                       <a:solidFill>
                         <a:srgbClr val="E0E0E0"/>
@@ -11044,7 +10580,7 @@
                     <a:bodyPr/>
                     <a:lstStyle/>
                     <a:p>
-                      <a:pPr marL="0" indent="0">
+                      <a:pPr indent="0" marL="0">
                         <a:buNone/>
                       </a:pPr>
                       <a:r>
@@ -11065,7 +10601,7 @@
                       </a:endParaRPr>
                     </a:p>
                   </a:txBody>
-                  <a:tcPr>
+                  <a:tcPr marL="91440" marR="91440" marT="45720" marB="45720">
                     <a:lnL w="6350" cap="flat" cmpd="sng" algn="ctr">
                       <a:solidFill>
                         <a:srgbClr val="E0E0E0"/>
@@ -11107,11 +10643,6 @@
                     </a:solidFill>
                   </a:tcPr>
                 </a:tc>
-                <a:extLst>
-                  <a:ext uri="{0D108BD9-81ED-4DB2-BD59-A6C34878D82A}">
-                    <a16:rowId xmlns:a16="http://schemas.microsoft.com/office/drawing/2014/main" val="10000"/>
-                  </a:ext>
-                </a:extLst>
               </a:tr>
               <a:tr h="457200">
                 <a:tc>
@@ -11119,7 +10650,7 @@
                     <a:bodyPr/>
                     <a:lstStyle/>
                     <a:p>
-                      <a:pPr marL="0" indent="0">
+                      <a:pPr indent="0" marL="0">
                         <a:buNone/>
                       </a:pPr>
                       <a:r>
@@ -11140,7 +10671,7 @@
                       </a:endParaRPr>
                     </a:p>
                   </a:txBody>
-                  <a:tcPr>
+                  <a:tcPr marL="91440" marR="91440" marT="45720" marB="45720">
                     <a:lnL w="6350" cap="flat" cmpd="sng" algn="ctr">
                       <a:solidFill>
                         <a:srgbClr val="E0E0E0"/>
@@ -11184,7 +10715,7 @@
                     <a:bodyPr/>
                     <a:lstStyle/>
                     <a:p>
-                      <a:pPr marL="0" indent="0">
+                      <a:pPr indent="0" marL="0">
                         <a:buNone/>
                       </a:pPr>
                       <a:r>
@@ -11205,7 +10736,7 @@
                       </a:endParaRPr>
                     </a:p>
                   </a:txBody>
-                  <a:tcPr>
+                  <a:tcPr marL="91440" marR="91440" marT="45720" marB="45720">
                     <a:lnL w="6350" cap="flat" cmpd="sng" algn="ctr">
                       <a:solidFill>
                         <a:srgbClr val="E0E0E0"/>
@@ -11249,7 +10780,7 @@
                     <a:bodyPr/>
                     <a:lstStyle/>
                     <a:p>
-                      <a:pPr marL="0" indent="0">
+                      <a:pPr indent="0" marL="0">
                         <a:buNone/>
                       </a:pPr>
                       <a:r>
@@ -11270,7 +10801,7 @@
                       </a:endParaRPr>
                     </a:p>
                   </a:txBody>
-                  <a:tcPr>
+                  <a:tcPr marL="91440" marR="91440" marT="45720" marB="45720">
                     <a:lnL w="6350" cap="flat" cmpd="sng" algn="ctr">
                       <a:solidFill>
                         <a:srgbClr val="E0E0E0"/>
@@ -11314,7 +10845,7 @@
                     <a:bodyPr/>
                     <a:lstStyle/>
                     <a:p>
-                      <a:pPr marL="0" indent="0">
+                      <a:pPr indent="0" marL="0">
                         <a:buNone/>
                       </a:pPr>
                       <a:r>
@@ -11335,7 +10866,7 @@
                       </a:endParaRPr>
                     </a:p>
                   </a:txBody>
-                  <a:tcPr>
+                  <a:tcPr marL="91440" marR="91440" marT="45720" marB="45720">
                     <a:lnL w="6350" cap="flat" cmpd="sng" algn="ctr">
                       <a:solidFill>
                         <a:srgbClr val="E0E0E0"/>
@@ -11374,11 +10905,6 @@
                     </a:lnB>
                   </a:tcPr>
                 </a:tc>
-                <a:extLst>
-                  <a:ext uri="{0D108BD9-81ED-4DB2-BD59-A6C34878D82A}">
-                    <a16:rowId xmlns:a16="http://schemas.microsoft.com/office/drawing/2014/main" val="10001"/>
-                  </a:ext>
-                </a:extLst>
               </a:tr>
               <a:tr h="457200">
                 <a:tc>
@@ -11386,7 +10912,7 @@
                     <a:bodyPr/>
                     <a:lstStyle/>
                     <a:p>
-                      <a:pPr marL="0" indent="0">
+                      <a:pPr indent="0" marL="0">
                         <a:buNone/>
                       </a:pPr>
                       <a:r>
@@ -11407,7 +10933,7 @@
                       </a:endParaRPr>
                     </a:p>
                   </a:txBody>
-                  <a:tcPr>
+                  <a:tcPr marL="91440" marR="91440" marT="45720" marB="45720">
                     <a:lnL w="6350" cap="flat" cmpd="sng" algn="ctr">
                       <a:solidFill>
                         <a:srgbClr val="E0E0E0"/>
@@ -11451,7 +10977,7 @@
                     <a:bodyPr/>
                     <a:lstStyle/>
                     <a:p>
-                      <a:pPr marL="0" indent="0">
+                      <a:pPr indent="0" marL="0">
                         <a:buNone/>
                       </a:pPr>
                       <a:r>
@@ -11472,7 +10998,7 @@
                       </a:endParaRPr>
                     </a:p>
                   </a:txBody>
-                  <a:tcPr>
+                  <a:tcPr marL="91440" marR="91440" marT="45720" marB="45720">
                     <a:lnL w="6350" cap="flat" cmpd="sng" algn="ctr">
                       <a:solidFill>
                         <a:srgbClr val="E0E0E0"/>
@@ -11516,7 +11042,7 @@
                     <a:bodyPr/>
                     <a:lstStyle/>
                     <a:p>
-                      <a:pPr marL="0" indent="0">
+                      <a:pPr indent="0" marL="0">
                         <a:buNone/>
                       </a:pPr>
                       <a:r>
@@ -11537,7 +11063,7 @@
                       </a:endParaRPr>
                     </a:p>
                   </a:txBody>
-                  <a:tcPr>
+                  <a:tcPr marL="91440" marR="91440" marT="45720" marB="45720">
                     <a:lnL w="6350" cap="flat" cmpd="sng" algn="ctr">
                       <a:solidFill>
                         <a:srgbClr val="E0E0E0"/>
@@ -11581,7 +11107,7 @@
                     <a:bodyPr/>
                     <a:lstStyle/>
                     <a:p>
-                      <a:pPr marL="0" indent="0">
+                      <a:pPr indent="0" marL="0">
                         <a:buNone/>
                       </a:pPr>
                       <a:r>
@@ -11602,7 +11128,7 @@
                       </a:endParaRPr>
                     </a:p>
                   </a:txBody>
-                  <a:tcPr>
+                  <a:tcPr marL="91440" marR="91440" marT="45720" marB="45720">
                     <a:lnL w="6350" cap="flat" cmpd="sng" algn="ctr">
                       <a:solidFill>
                         <a:srgbClr val="E0E0E0"/>
@@ -11641,11 +11167,6 @@
                     </a:lnB>
                   </a:tcPr>
                 </a:tc>
-                <a:extLst>
-                  <a:ext uri="{0D108BD9-81ED-4DB2-BD59-A6C34878D82A}">
-                    <a16:rowId xmlns:a16="http://schemas.microsoft.com/office/drawing/2014/main" val="10002"/>
-                  </a:ext>
-                </a:extLst>
               </a:tr>
               <a:tr h="457200">
                 <a:tc>
@@ -11653,7 +11174,7 @@
                     <a:bodyPr/>
                     <a:lstStyle/>
                     <a:p>
-                      <a:pPr marL="0" indent="0">
+                      <a:pPr indent="0" marL="0">
                         <a:buNone/>
                       </a:pPr>
                       <a:r>
@@ -11674,7 +11195,7 @@
                       </a:endParaRPr>
                     </a:p>
                   </a:txBody>
-                  <a:tcPr>
+                  <a:tcPr marL="91440" marR="91440" marT="45720" marB="45720">
                     <a:lnL w="6350" cap="flat" cmpd="sng" algn="ctr">
                       <a:solidFill>
                         <a:srgbClr val="E0E0E0"/>
@@ -11718,7 +11239,7 @@
                     <a:bodyPr/>
                     <a:lstStyle/>
                     <a:p>
-                      <a:pPr marL="0" indent="0">
+                      <a:pPr indent="0" marL="0">
                         <a:buNone/>
                       </a:pPr>
                       <a:r>
@@ -11739,7 +11260,7 @@
                       </a:endParaRPr>
                     </a:p>
                   </a:txBody>
-                  <a:tcPr>
+                  <a:tcPr marL="91440" marR="91440" marT="45720" marB="45720">
                     <a:lnL w="6350" cap="flat" cmpd="sng" algn="ctr">
                       <a:solidFill>
                         <a:srgbClr val="E0E0E0"/>
@@ -11783,7 +11304,7 @@
                     <a:bodyPr/>
                     <a:lstStyle/>
                     <a:p>
-                      <a:pPr marL="0" indent="0">
+                      <a:pPr indent="0" marL="0">
                         <a:buNone/>
                       </a:pPr>
                       <a:r>
@@ -11804,7 +11325,7 @@
                       </a:endParaRPr>
                     </a:p>
                   </a:txBody>
-                  <a:tcPr>
+                  <a:tcPr marL="91440" marR="91440" marT="45720" marB="45720">
                     <a:lnL w="6350" cap="flat" cmpd="sng" algn="ctr">
                       <a:solidFill>
                         <a:srgbClr val="E0E0E0"/>
@@ -11848,7 +11369,7 @@
                     <a:bodyPr/>
                     <a:lstStyle/>
                     <a:p>
-                      <a:pPr marL="0" indent="0">
+                      <a:pPr indent="0" marL="0">
                         <a:buNone/>
                       </a:pPr>
                       <a:r>
@@ -11869,7 +11390,7 @@
                       </a:endParaRPr>
                     </a:p>
                   </a:txBody>
-                  <a:tcPr>
+                  <a:tcPr marL="91440" marR="91440" marT="45720" marB="45720">
                     <a:lnL w="6350" cap="flat" cmpd="sng" algn="ctr">
                       <a:solidFill>
                         <a:srgbClr val="E0E0E0"/>
@@ -11908,11 +11429,6 @@
                     </a:lnB>
                   </a:tcPr>
                 </a:tc>
-                <a:extLst>
-                  <a:ext uri="{0D108BD9-81ED-4DB2-BD59-A6C34878D82A}">
-                    <a16:rowId xmlns:a16="http://schemas.microsoft.com/office/drawing/2014/main" val="10003"/>
-                  </a:ext>
-                </a:extLst>
               </a:tr>
             </a:tbl>
           </a:graphicData>
@@ -11939,7 +11455,7 @@
           <a:bodyPr wrap="square" rtlCol="0" anchor="ctr"/>
           <a:lstStyle/>
           <a:p>
-            <a:pPr marL="0" indent="0" algn="r">
+            <a:pPr algn="r" indent="0" marL="0">
               <a:buNone/>
             </a:pPr>
             <a:r>
@@ -11973,7 +11489,6 @@
         <a:solidFill>
           <a:srgbClr val="FAFAFA"/>
         </a:solidFill>
-        <a:effectLst/>
       </p:bgPr>
     </p:bg>
     <p:spTree>
@@ -12009,13 +11524,6 @@
           </a:solidFill>
           <a:ln/>
         </p:spPr>
-        <p:txBody>
-          <a:bodyPr/>
-          <a:lstStyle/>
-          <a:p>
-            <a:endParaRPr lang="en-US"/>
-          </a:p>
-        </p:txBody>
       </p:sp>
       <p:sp>
         <p:nvSpPr>
@@ -12038,7 +11546,7 @@
           <a:bodyPr wrap="square" lIns="0" tIns="0" rIns="0" bIns="0" rtlCol="0" anchor="ctr"/>
           <a:lstStyle/>
           <a:p>
-            <a:pPr marL="0" indent="0">
+            <a:pPr indent="0" marL="0">
               <a:buNone/>
             </a:pPr>
             <a:r>
@@ -12077,7 +11585,7 @@
           <a:bodyPr wrap="square" lIns="0" tIns="0" rIns="0" bIns="0" rtlCol="0" anchor="ctr"/>
           <a:lstStyle/>
           <a:p>
-            <a:pPr marL="0" indent="0">
+            <a:pPr indent="0" marL="0">
               <a:buNone/>
             </a:pPr>
             <a:r>
@@ -12114,20 +11622,13 @@
           </a:solidFill>
           <a:ln/>
           <a:effectLst>
-            <a:outerShdw blurRad="50800" dist="12700" dir="8100000" algn="bl" rotWithShape="0">
+            <a:outerShdw sx="100000" sy="100000" kx="0" ky="0" algn="bl" rotWithShape="0" blurRad="50800" dist="12700" dir="8100000">
               <a:srgbClr val="000000">
                 <a:alpha val="8000"/>
               </a:srgbClr>
             </a:outerShdw>
           </a:effectLst>
         </p:spPr>
-        <p:txBody>
-          <a:bodyPr/>
-          <a:lstStyle/>
-          <a:p>
-            <a:endParaRPr lang="en-US"/>
-          </a:p>
-        </p:txBody>
       </p:sp>
       <p:sp>
         <p:nvSpPr>
@@ -12148,13 +11649,6 @@
           </a:solidFill>
           <a:ln/>
         </p:spPr>
-        <p:txBody>
-          <a:bodyPr/>
-          <a:lstStyle/>
-          <a:p>
-            <a:endParaRPr lang="en-US"/>
-          </a:p>
-        </p:txBody>
       </p:sp>
       <p:sp>
         <p:nvSpPr>
@@ -12177,7 +11671,7 @@
           <a:bodyPr wrap="square" lIns="0" tIns="0" rIns="0" bIns="0" rtlCol="0" anchor="ctr"/>
           <a:lstStyle/>
           <a:p>
-            <a:pPr marL="0" indent="0" algn="ctr">
+            <a:pPr algn="ctr" indent="0" marL="0">
               <a:buNone/>
             </a:pPr>
             <a:r>
@@ -12217,13 +11711,6 @@
             <a:prstDash val="solid"/>
           </a:ln>
         </p:spPr>
-        <p:txBody>
-          <a:bodyPr/>
-          <a:lstStyle/>
-          <a:p>
-            <a:endParaRPr lang="en-US"/>
-          </a:p>
-        </p:txBody>
       </p:sp>
       <p:sp>
         <p:nvSpPr>
@@ -12244,20 +11731,13 @@
           </a:solidFill>
           <a:ln/>
           <a:effectLst>
-            <a:outerShdw blurRad="50800" dist="12700" dir="8100000" algn="bl" rotWithShape="0">
+            <a:outerShdw sx="100000" sy="100000" kx="0" ky="0" algn="bl" rotWithShape="0" blurRad="50800" dist="12700" dir="8100000">
               <a:srgbClr val="000000">
                 <a:alpha val="8000"/>
               </a:srgbClr>
             </a:outerShdw>
           </a:effectLst>
         </p:spPr>
-        <p:txBody>
-          <a:bodyPr/>
-          <a:lstStyle/>
-          <a:p>
-            <a:endParaRPr lang="en-US"/>
-          </a:p>
-        </p:txBody>
       </p:sp>
       <p:sp>
         <p:nvSpPr>
@@ -12278,13 +11758,6 @@
           </a:solidFill>
           <a:ln/>
         </p:spPr>
-        <p:txBody>
-          <a:bodyPr/>
-          <a:lstStyle/>
-          <a:p>
-            <a:endParaRPr lang="en-US"/>
-          </a:p>
-        </p:txBody>
       </p:sp>
       <p:sp>
         <p:nvSpPr>
@@ -12307,7 +11780,7 @@
           <a:bodyPr wrap="square" lIns="0" tIns="0" rIns="0" bIns="0" rtlCol="0" anchor="ctr"/>
           <a:lstStyle/>
           <a:p>
-            <a:pPr marL="0" indent="0" algn="ctr">
+            <a:pPr algn="ctr" indent="0" marL="0">
               <a:buNone/>
             </a:pPr>
             <a:r>
@@ -12347,13 +11820,6 @@
             <a:prstDash val="solid"/>
           </a:ln>
         </p:spPr>
-        <p:txBody>
-          <a:bodyPr/>
-          <a:lstStyle/>
-          <a:p>
-            <a:endParaRPr lang="en-US"/>
-          </a:p>
-        </p:txBody>
       </p:sp>
       <p:sp>
         <p:nvSpPr>
@@ -12374,20 +11840,13 @@
           </a:solidFill>
           <a:ln/>
           <a:effectLst>
-            <a:outerShdw blurRad="50800" dist="12700" dir="8100000" algn="bl" rotWithShape="0">
+            <a:outerShdw sx="100000" sy="100000" kx="0" ky="0" algn="bl" rotWithShape="0" blurRad="50800" dist="12700" dir="8100000">
               <a:srgbClr val="000000">
                 <a:alpha val="8000"/>
               </a:srgbClr>
             </a:outerShdw>
           </a:effectLst>
         </p:spPr>
-        <p:txBody>
-          <a:bodyPr/>
-          <a:lstStyle/>
-          <a:p>
-            <a:endParaRPr lang="en-US"/>
-          </a:p>
-        </p:txBody>
       </p:sp>
       <p:sp>
         <p:nvSpPr>
@@ -12408,13 +11867,6 @@
           </a:solidFill>
           <a:ln/>
         </p:spPr>
-        <p:txBody>
-          <a:bodyPr/>
-          <a:lstStyle/>
-          <a:p>
-            <a:endParaRPr lang="en-US"/>
-          </a:p>
-        </p:txBody>
       </p:sp>
       <p:sp>
         <p:nvSpPr>
@@ -12437,7 +11889,7 @@
           <a:bodyPr wrap="square" lIns="0" tIns="0" rIns="0" bIns="0" rtlCol="0" anchor="ctr"/>
           <a:lstStyle/>
           <a:p>
-            <a:pPr marL="0" indent="0" algn="ctr">
+            <a:pPr algn="ctr" indent="0" marL="0">
               <a:buNone/>
             </a:pPr>
             <a:r>
@@ -12477,13 +11929,6 @@
             <a:prstDash val="solid"/>
           </a:ln>
         </p:spPr>
-        <p:txBody>
-          <a:bodyPr/>
-          <a:lstStyle/>
-          <a:p>
-            <a:endParaRPr lang="en-US"/>
-          </a:p>
-        </p:txBody>
       </p:sp>
       <p:sp>
         <p:nvSpPr>
@@ -12504,20 +11949,13 @@
           </a:solidFill>
           <a:ln/>
           <a:effectLst>
-            <a:outerShdw blurRad="50800" dist="12700" dir="8100000" algn="bl" rotWithShape="0">
+            <a:outerShdw sx="100000" sy="100000" kx="0" ky="0" algn="bl" rotWithShape="0" blurRad="50800" dist="12700" dir="8100000">
               <a:srgbClr val="000000">
                 <a:alpha val="8000"/>
               </a:srgbClr>
             </a:outerShdw>
           </a:effectLst>
         </p:spPr>
-        <p:txBody>
-          <a:bodyPr/>
-          <a:lstStyle/>
-          <a:p>
-            <a:endParaRPr lang="en-US"/>
-          </a:p>
-        </p:txBody>
       </p:sp>
       <p:sp>
         <p:nvSpPr>
@@ -12538,13 +11976,6 @@
           </a:solidFill>
           <a:ln/>
         </p:spPr>
-        <p:txBody>
-          <a:bodyPr/>
-          <a:lstStyle/>
-          <a:p>
-            <a:endParaRPr lang="en-US"/>
-          </a:p>
-        </p:txBody>
       </p:sp>
       <p:sp>
         <p:nvSpPr>
@@ -12567,7 +11998,7 @@
           <a:bodyPr wrap="square" lIns="0" tIns="0" rIns="0" bIns="0" rtlCol="0" anchor="ctr"/>
           <a:lstStyle/>
           <a:p>
-            <a:pPr marL="0" indent="0" algn="ctr">
+            <a:pPr algn="ctr" indent="0" marL="0">
               <a:buNone/>
             </a:pPr>
             <a:r>
@@ -12606,7 +12037,7 @@
           <a:bodyPr wrap="square" lIns="0" tIns="0" rIns="0" bIns="0" rtlCol="0" anchor="ctr"/>
           <a:lstStyle/>
           <a:p>
-            <a:pPr marL="0" indent="0">
+            <a:pPr indent="0" marL="0">
               <a:buNone/>
             </a:pPr>
             <a:r>
@@ -12643,20 +12074,13 @@
           </a:solidFill>
           <a:ln/>
           <a:effectLst>
-            <a:outerShdw blurRad="50800" dist="12700" dir="8100000" algn="bl" rotWithShape="0">
+            <a:outerShdw sx="100000" sy="100000" kx="0" ky="0" algn="bl" rotWithShape="0" blurRad="50800" dist="12700" dir="8100000">
               <a:srgbClr val="000000">
                 <a:alpha val="8000"/>
               </a:srgbClr>
             </a:outerShdw>
           </a:effectLst>
         </p:spPr>
-        <p:txBody>
-          <a:bodyPr/>
-          <a:lstStyle/>
-          <a:p>
-            <a:endParaRPr lang="en-US"/>
-          </a:p>
-        </p:txBody>
       </p:sp>
       <p:sp>
         <p:nvSpPr>
@@ -12677,13 +12101,6 @@
           </a:solidFill>
           <a:ln/>
         </p:spPr>
-        <p:txBody>
-          <a:bodyPr/>
-          <a:lstStyle/>
-          <a:p>
-            <a:endParaRPr lang="en-US"/>
-          </a:p>
-        </p:txBody>
       </p:sp>
       <p:sp>
         <p:nvSpPr>
@@ -12706,7 +12123,7 @@
           <a:bodyPr wrap="square" lIns="0" tIns="0" rIns="0" bIns="0" rtlCol="0" anchor="ctr"/>
           <a:lstStyle/>
           <a:p>
-            <a:pPr marL="0" indent="0" algn="ctr">
+            <a:pPr algn="ctr" indent="0" marL="0">
               <a:buNone/>
             </a:pPr>
             <a:r>
@@ -12746,13 +12163,6 @@
             <a:prstDash val="solid"/>
           </a:ln>
         </p:spPr>
-        <p:txBody>
-          <a:bodyPr/>
-          <a:lstStyle/>
-          <a:p>
-            <a:endParaRPr lang="en-US"/>
-          </a:p>
-        </p:txBody>
       </p:sp>
       <p:sp>
         <p:nvSpPr>
@@ -12773,20 +12183,13 @@
           </a:solidFill>
           <a:ln/>
           <a:effectLst>
-            <a:outerShdw blurRad="50800" dist="12700" dir="8100000" algn="bl" rotWithShape="0">
+            <a:outerShdw sx="100000" sy="100000" kx="0" ky="0" algn="bl" rotWithShape="0" blurRad="50800" dist="12700" dir="8100000">
               <a:srgbClr val="000000">
                 <a:alpha val="8000"/>
               </a:srgbClr>
             </a:outerShdw>
           </a:effectLst>
         </p:spPr>
-        <p:txBody>
-          <a:bodyPr/>
-          <a:lstStyle/>
-          <a:p>
-            <a:endParaRPr lang="en-US"/>
-          </a:p>
-        </p:txBody>
       </p:sp>
       <p:sp>
         <p:nvSpPr>
@@ -12807,13 +12210,6 @@
           </a:solidFill>
           <a:ln/>
         </p:spPr>
-        <p:txBody>
-          <a:bodyPr/>
-          <a:lstStyle/>
-          <a:p>
-            <a:endParaRPr lang="en-US"/>
-          </a:p>
-        </p:txBody>
       </p:sp>
       <p:sp>
         <p:nvSpPr>
@@ -12836,7 +12232,7 @@
           <a:bodyPr wrap="square" lIns="0" tIns="0" rIns="0" bIns="0" rtlCol="0" anchor="ctr"/>
           <a:lstStyle/>
           <a:p>
-            <a:pPr marL="0" indent="0" algn="ctr">
+            <a:pPr algn="ctr" indent="0" marL="0">
               <a:buNone/>
             </a:pPr>
             <a:r>
@@ -12876,13 +12272,6 @@
             <a:prstDash val="solid"/>
           </a:ln>
         </p:spPr>
-        <p:txBody>
-          <a:bodyPr/>
-          <a:lstStyle/>
-          <a:p>
-            <a:endParaRPr lang="en-US"/>
-          </a:p>
-        </p:txBody>
       </p:sp>
       <p:sp>
         <p:nvSpPr>
@@ -12903,20 +12292,13 @@
           </a:solidFill>
           <a:ln/>
           <a:effectLst>
-            <a:outerShdw blurRad="50800" dist="12700" dir="8100000" algn="bl" rotWithShape="0">
+            <a:outerShdw sx="100000" sy="100000" kx="0" ky="0" algn="bl" rotWithShape="0" blurRad="50800" dist="12700" dir="8100000">
               <a:srgbClr val="000000">
                 <a:alpha val="8000"/>
               </a:srgbClr>
             </a:outerShdw>
           </a:effectLst>
         </p:spPr>
-        <p:txBody>
-          <a:bodyPr/>
-          <a:lstStyle/>
-          <a:p>
-            <a:endParaRPr lang="en-US"/>
-          </a:p>
-        </p:txBody>
       </p:sp>
       <p:sp>
         <p:nvSpPr>
@@ -12937,13 +12319,6 @@
           </a:solidFill>
           <a:ln/>
         </p:spPr>
-        <p:txBody>
-          <a:bodyPr/>
-          <a:lstStyle/>
-          <a:p>
-            <a:endParaRPr lang="en-US"/>
-          </a:p>
-        </p:txBody>
       </p:sp>
       <p:sp>
         <p:nvSpPr>
@@ -12966,7 +12341,7 @@
           <a:bodyPr wrap="square" lIns="0" tIns="0" rIns="0" bIns="0" rtlCol="0" anchor="ctr"/>
           <a:lstStyle/>
           <a:p>
-            <a:pPr marL="0" indent="0" algn="ctr">
+            <a:pPr algn="ctr" indent="0" marL="0">
               <a:buNone/>
             </a:pPr>
             <a:r>
@@ -13005,7 +12380,7 @@
           <a:bodyPr wrap="square" lIns="0" tIns="0" rIns="0" bIns="0" rtlCol="0" anchor="ctr"/>
           <a:lstStyle/>
           <a:p>
-            <a:pPr marL="0" indent="0">
+            <a:pPr indent="0" marL="0">
               <a:buNone/>
             </a:pPr>
             <a:r>
@@ -13044,7 +12419,7 @@
           <a:bodyPr wrap="square" rtlCol="0" anchor="ctr"/>
           <a:lstStyle/>
           <a:p>
-            <a:pPr marL="0" indent="0" algn="r">
+            <a:pPr algn="r" indent="0" marL="0">
               <a:buNone/>
             </a:pPr>
             <a:r>
@@ -13363,319 +12738,4 @@
     </a:ext>
   </a:extLst>
 </a:theme>
-</file>
-
-<file path=ppt/theme/theme2.xml><?xml version="1.0" encoding="utf-8"?>
-<a:theme xmlns:a="http://schemas.openxmlformats.org/drawingml/2006/main" name="Office Theme">
-  <a:themeElements>
-    <a:clrScheme name="Office">
-      <a:dk1>
-        <a:sysClr val="windowText" lastClr="000000"/>
-      </a:dk1>
-      <a:lt1>
-        <a:sysClr val="window" lastClr="FFFFFF"/>
-      </a:lt1>
-      <a:dk2>
-        <a:srgbClr val="0E2841"/>
-      </a:dk2>
-      <a:lt2>
-        <a:srgbClr val="E8E8E8"/>
-      </a:lt2>
-      <a:accent1>
-        <a:srgbClr val="156082"/>
-      </a:accent1>
-      <a:accent2>
-        <a:srgbClr val="E97132"/>
-      </a:accent2>
-      <a:accent3>
-        <a:srgbClr val="196B24"/>
-      </a:accent3>
-      <a:accent4>
-        <a:srgbClr val="0F9ED5"/>
-      </a:accent4>
-      <a:accent5>
-        <a:srgbClr val="A02B93"/>
-      </a:accent5>
-      <a:accent6>
-        <a:srgbClr val="4EA72E"/>
-      </a:accent6>
-      <a:hlink>
-        <a:srgbClr val="467886"/>
-      </a:hlink>
-      <a:folHlink>
-        <a:srgbClr val="96607D"/>
-      </a:folHlink>
-    </a:clrScheme>
-    <a:fontScheme name="Office">
-      <a:majorFont>
-        <a:latin typeface="Aptos Display" panose="02110004020202020204"/>
-        <a:ea typeface=""/>
-        <a:cs typeface=""/>
-        <a:font script="Jpan" typeface="游ゴシック Light"/>
-        <a:font script="Hang" typeface="맑은 고딕"/>
-        <a:font script="Hans" typeface="等线 Light"/>
-        <a:font script="Hant" typeface="新細明體"/>
-        <a:font script="Arab" typeface="Times New Roman"/>
-        <a:font script="Hebr" typeface="Times New Roman"/>
-        <a:font script="Thai" typeface="Angsana New"/>
-        <a:font script="Ethi" typeface="Nyala"/>
-        <a:font script="Beng" typeface="Vrinda"/>
-        <a:font script="Gujr" typeface="Shruti"/>
-        <a:font script="Khmr" typeface="MoolBoran"/>
-        <a:font script="Knda" typeface="Tunga"/>
-        <a:font script="Guru" typeface="Raavi"/>
-        <a:font script="Cans" typeface="Euphemia"/>
-        <a:font script="Cher" typeface="Plantagenet Cherokee"/>
-        <a:font script="Yiii" typeface="Microsoft Yi Baiti"/>
-        <a:font script="Tibt" typeface="Microsoft Himalaya"/>
-        <a:font script="Thaa" typeface="MV Boli"/>
-        <a:font script="Deva" typeface="Mangal"/>
-        <a:font script="Telu" typeface="Gautami"/>
-        <a:font script="Taml" typeface="Latha"/>
-        <a:font script="Syrc" typeface="Estrangelo Edessa"/>
-        <a:font script="Orya" typeface="Kalinga"/>
-        <a:font script="Mlym" typeface="Kartika"/>
-        <a:font script="Laoo" typeface="DokChampa"/>
-        <a:font script="Sinh" typeface="Iskoola Pota"/>
-        <a:font script="Mong" typeface="Mongolian Baiti"/>
-        <a:font script="Viet" typeface="Times New Roman"/>
-        <a:font script="Uigh" typeface="Microsoft Uighur"/>
-        <a:font script="Geor" typeface="Sylfaen"/>
-        <a:font script="Armn" typeface="Arial"/>
-        <a:font script="Bugi" typeface="Leelawadee UI"/>
-        <a:font script="Bopo" typeface="Microsoft JhengHei"/>
-        <a:font script="Java" typeface="Javanese Text"/>
-        <a:font script="Lisu" typeface="Segoe UI"/>
-        <a:font script="Mymr" typeface="Myanmar Text"/>
-        <a:font script="Nkoo" typeface="Ebrima"/>
-        <a:font script="Olck" typeface="Nirmala UI"/>
-        <a:font script="Osma" typeface="Ebrima"/>
-        <a:font script="Phag" typeface="Phagspa"/>
-        <a:font script="Syrn" typeface="Estrangelo Edessa"/>
-        <a:font script="Syrj" typeface="Estrangelo Edessa"/>
-        <a:font script="Syre" typeface="Estrangelo Edessa"/>
-        <a:font script="Sora" typeface="Nirmala UI"/>
-        <a:font script="Tale" typeface="Microsoft Tai Le"/>
-        <a:font script="Talu" typeface="Microsoft New Tai Lue"/>
-        <a:font script="Tfng" typeface="Ebrima"/>
-      </a:majorFont>
-      <a:minorFont>
-        <a:latin typeface="Aptos" panose="02110004020202020204"/>
-        <a:ea typeface=""/>
-        <a:cs typeface=""/>
-        <a:font script="Jpan" typeface="游ゴシック"/>
-        <a:font script="Hang" typeface="맑은 고딕"/>
-        <a:font script="Hans" typeface="等线"/>
-        <a:font script="Hant" typeface="新細明體"/>
-        <a:font script="Arab" typeface="Arial"/>
-        <a:font script="Hebr" typeface="Arial"/>
-        <a:font script="Thai" typeface="Cordia New"/>
-        <a:font script="Ethi" typeface="Nyala"/>
-        <a:font script="Beng" typeface="Vrinda"/>
-        <a:font script="Gujr" typeface="Shruti"/>
-        <a:font script="Khmr" typeface="DaunPenh"/>
-        <a:font script="Knda" typeface="Tunga"/>
-        <a:font script="Guru" typeface="Raavi"/>
-        <a:font script="Cans" typeface="Euphemia"/>
-        <a:font script="Cher" typeface="Plantagenet Cherokee"/>
-        <a:font script="Yiii" typeface="Microsoft Yi Baiti"/>
-        <a:font script="Tibt" typeface="Microsoft Himalaya"/>
-        <a:font script="Thaa" typeface="MV Boli"/>
-        <a:font script="Deva" typeface="Mangal"/>
-        <a:font script="Telu" typeface="Gautami"/>
-        <a:font script="Taml" typeface="Latha"/>
-        <a:font script="Syrc" typeface="Estrangelo Edessa"/>
-        <a:font script="Orya" typeface="Kalinga"/>
-        <a:font script="Mlym" typeface="Kartika"/>
-        <a:font script="Laoo" typeface="DokChampa"/>
-        <a:font script="Sinh" typeface="Iskoola Pota"/>
-        <a:font script="Mong" typeface="Mongolian Baiti"/>
-        <a:font script="Viet" typeface="Arial"/>
-        <a:font script="Uigh" typeface="Microsoft Uighur"/>
-        <a:font script="Geor" typeface="Sylfaen"/>
-        <a:font script="Armn" typeface="Arial"/>
-        <a:font script="Bugi" typeface="Leelawadee UI"/>
-        <a:font script="Bopo" typeface="Microsoft JhengHei"/>
-        <a:font script="Java" typeface="Javanese Text"/>
-        <a:font script="Lisu" typeface="Segoe UI"/>
-        <a:font script="Mymr" typeface="Myanmar Text"/>
-        <a:font script="Nkoo" typeface="Ebrima"/>
-        <a:font script="Olck" typeface="Nirmala UI"/>
-        <a:font script="Osma" typeface="Ebrima"/>
-        <a:font script="Phag" typeface="Phagspa"/>
-        <a:font script="Syrn" typeface="Estrangelo Edessa"/>
-        <a:font script="Syrj" typeface="Estrangelo Edessa"/>
-        <a:font script="Syre" typeface="Estrangelo Edessa"/>
-        <a:font script="Sora" typeface="Nirmala UI"/>
-        <a:font script="Tale" typeface="Microsoft Tai Le"/>
-        <a:font script="Talu" typeface="Microsoft New Tai Lue"/>
-        <a:font script="Tfng" typeface="Ebrima"/>
-      </a:minorFont>
-    </a:fontScheme>
-    <a:fmtScheme name="Office">
-      <a:fillStyleLst>
-        <a:solidFill>
-          <a:schemeClr val="phClr"/>
-        </a:solidFill>
-        <a:gradFill rotWithShape="1">
-          <a:gsLst>
-            <a:gs pos="0">
-              <a:schemeClr val="phClr">
-                <a:lumMod val="110000"/>
-                <a:satMod val="105000"/>
-                <a:tint val="67000"/>
-              </a:schemeClr>
-            </a:gs>
-            <a:gs pos="50000">
-              <a:schemeClr val="phClr">
-                <a:lumMod val="105000"/>
-                <a:satMod val="103000"/>
-                <a:tint val="73000"/>
-              </a:schemeClr>
-            </a:gs>
-            <a:gs pos="100000">
-              <a:schemeClr val="phClr">
-                <a:lumMod val="105000"/>
-                <a:satMod val="109000"/>
-                <a:tint val="81000"/>
-              </a:schemeClr>
-            </a:gs>
-          </a:gsLst>
-          <a:lin ang="5400000" scaled="0"/>
-        </a:gradFill>
-        <a:gradFill rotWithShape="1">
-          <a:gsLst>
-            <a:gs pos="0">
-              <a:schemeClr val="phClr">
-                <a:satMod val="103000"/>
-                <a:lumMod val="102000"/>
-                <a:tint val="94000"/>
-              </a:schemeClr>
-            </a:gs>
-            <a:gs pos="50000">
-              <a:schemeClr val="phClr">
-                <a:satMod val="110000"/>
-                <a:lumMod val="100000"/>
-                <a:shade val="100000"/>
-              </a:schemeClr>
-            </a:gs>
-            <a:gs pos="100000">
-              <a:schemeClr val="phClr">
-                <a:lumMod val="99000"/>
-                <a:satMod val="120000"/>
-                <a:shade val="78000"/>
-              </a:schemeClr>
-            </a:gs>
-          </a:gsLst>
-          <a:lin ang="5400000" scaled="0"/>
-        </a:gradFill>
-      </a:fillStyleLst>
-      <a:lnStyleLst>
-        <a:ln w="12700" cap="flat" cmpd="sng" algn="ctr">
-          <a:solidFill>
-            <a:schemeClr val="phClr"/>
-          </a:solidFill>
-          <a:prstDash val="solid"/>
-          <a:miter lim="800000"/>
-        </a:ln>
-        <a:ln w="19050" cap="flat" cmpd="sng" algn="ctr">
-          <a:solidFill>
-            <a:schemeClr val="phClr"/>
-          </a:solidFill>
-          <a:prstDash val="solid"/>
-          <a:miter lim="800000"/>
-        </a:ln>
-        <a:ln w="25400" cap="flat" cmpd="sng" algn="ctr">
-          <a:solidFill>
-            <a:schemeClr val="phClr"/>
-          </a:solidFill>
-          <a:prstDash val="solid"/>
-          <a:miter lim="800000"/>
-        </a:ln>
-      </a:lnStyleLst>
-      <a:effectStyleLst>
-        <a:effectStyle>
-          <a:effectLst/>
-        </a:effectStyle>
-        <a:effectStyle>
-          <a:effectLst/>
-        </a:effectStyle>
-        <a:effectStyle>
-          <a:effectLst>
-            <a:outerShdw blurRad="57150" dist="19050" dir="5400000" algn="ctr" rotWithShape="0">
-              <a:srgbClr val="000000">
-                <a:alpha val="63000"/>
-              </a:srgbClr>
-            </a:outerShdw>
-          </a:effectLst>
-        </a:effectStyle>
-      </a:effectStyleLst>
-      <a:bgFillStyleLst>
-        <a:solidFill>
-          <a:schemeClr val="phClr"/>
-        </a:solidFill>
-        <a:solidFill>
-          <a:schemeClr val="phClr">
-            <a:tint val="95000"/>
-            <a:satMod val="170000"/>
-          </a:schemeClr>
-        </a:solidFill>
-        <a:gradFill rotWithShape="1">
-          <a:gsLst>
-            <a:gs pos="0">
-              <a:schemeClr val="phClr">
-                <a:tint val="93000"/>
-                <a:satMod val="150000"/>
-                <a:shade val="98000"/>
-                <a:lumMod val="102000"/>
-              </a:schemeClr>
-            </a:gs>
-            <a:gs pos="50000">
-              <a:schemeClr val="phClr">
-                <a:tint val="98000"/>
-                <a:satMod val="130000"/>
-                <a:shade val="90000"/>
-                <a:lumMod val="103000"/>
-              </a:schemeClr>
-            </a:gs>
-            <a:gs pos="100000">
-              <a:schemeClr val="phClr">
-                <a:shade val="63000"/>
-                <a:satMod val="120000"/>
-              </a:schemeClr>
-            </a:gs>
-          </a:gsLst>
-          <a:lin ang="5400000" scaled="0"/>
-        </a:gradFill>
-      </a:bgFillStyleLst>
-    </a:fmtScheme>
-  </a:themeElements>
-  <a:objectDefaults>
-    <a:lnDef>
-      <a:spPr/>
-      <a:bodyPr/>
-      <a:lstStyle/>
-      <a:style>
-        <a:lnRef idx="2">
-          <a:schemeClr val="accent1"/>
-        </a:lnRef>
-        <a:fillRef idx="0">
-          <a:schemeClr val="accent1"/>
-        </a:fillRef>
-        <a:effectRef idx="1">
-          <a:schemeClr val="accent1"/>
-        </a:effectRef>
-        <a:fontRef idx="minor">
-          <a:schemeClr val="tx1"/>
-        </a:fontRef>
-      </a:style>
-    </a:lnDef>
-  </a:objectDefaults>
-  <a:extraClrSchemeLst/>
-  <a:extLst>
-    <a:ext uri="{05A4C25C-085E-4340-85A3-A5531E510DB2}">
-      <thm15:themeFamily xmlns:thm15="http://schemas.microsoft.com/office/thememl/2012/main" name="Office Theme" id="{2E142A2C-CD16-42D6-873A-C26D2A0506FA}" vid="{1BDDFF52-6CD6-40A5-AB3C-68EB2F1E4D0A}"/>
-    </a:ext>
-  </a:extLst>
-</a:theme>
 </file>
</xml_diff>